<commit_message>
update to sdoh graphic
</commit_message>
<xml_diff>
--- a/input/images-source/SDOHAssessmentDiagrams_USCore_C-CDA.pptx
+++ b/input/images-source/SDOHAssessmentDiagrams_USCore_C-CDA.pptx
@@ -106,6 +106,11 @@
       </a:defRPr>
     </a:lvl9pPr>
   </p:defaultTextStyle>
+  <p:extLst>
+    <p:ext uri="{EFAFB233-063F-42B5-8137-9DF3F51BA10A}">
+      <p15:sldGuideLst xmlns:p15="http://schemas.microsoft.com/office/powerpoint/2012/main"/>
+    </p:ext>
+  </p:extLst>
 </p:presentation>
 </file>
 
@@ -1686,9 +1691,10 @@
         <a:lstStyle/>
         <a:p>
           <a:r>
-            <a:rPr lang="en-US" dirty="0"/>
-            <a:t>Assessing</a:t>
+            <a:rPr lang="en-US"/>
+            <a:t>SDOH Assessments</a:t>
           </a:r>
+          <a:endParaRPr lang="en-US" dirty="0"/>
         </a:p>
       </dgm:t>
     </dgm:pt>
@@ -1723,24 +1729,9 @@
         <a:p>
           <a:r>
             <a:rPr lang="en-US" dirty="0"/>
-            <a:t>Identifying SDOH </a:t>
+            <a:t>Identifying an SDOH Condition</a:t>
           </a:r>
-          <a:r>
-            <a:rPr lang="en-US" dirty="0">
-              <a:solidFill>
-                <a:schemeClr val="bg1"/>
-              </a:solidFill>
-              <a:hlinkClick xmlns:r="http://schemas.openxmlformats.org/officeDocument/2006/relationships" r:id="rId1">
-                <a:extLst>
-                  <a:ext uri="{A12FA001-AC4F-418D-AE19-62706E023703}">
-                    <ahyp:hlinkClr xmlns:ahyp="http://schemas.microsoft.com/office/drawing/2018/hyperlinkcolor" val="tx"/>
-                  </a:ext>
-                </a:extLst>
-              </a:hlinkClick>
-            </a:rPr>
-            <a:t>Condition</a:t>
-          </a:r>
-          <a:endParaRPr lang="en-US" dirty="0">
+          <a:endParaRPr lang="en-US" u="sng" dirty="0">
             <a:solidFill>
               <a:schemeClr val="bg1"/>
             </a:solidFill>
@@ -1779,7 +1770,7 @@
         <a:p>
           <a:r>
             <a:rPr lang="en-US" dirty="0"/>
-            <a:t>SDOH</a:t>
+            <a:t>Initiating an SDOH</a:t>
           </a:r>
           <a:r>
             <a:rPr lang="en-US" dirty="0">
@@ -1787,28 +1778,8 @@
                 <a:schemeClr val="bg1"/>
               </a:solidFill>
             </a:rPr>
-            <a:t> </a:t>
+            <a:t> Service Request</a:t>
           </a:r>
-          <a:r>
-            <a:rPr lang="en-US" dirty="0">
-              <a:solidFill>
-                <a:schemeClr val="bg1"/>
-              </a:solidFill>
-              <a:hlinkClick xmlns:r="http://schemas.openxmlformats.org/officeDocument/2006/relationships" r:id="rId2">
-                <a:extLst>
-                  <a:ext uri="{A12FA001-AC4F-418D-AE19-62706E023703}">
-                    <ahyp:hlinkClr xmlns:ahyp="http://schemas.microsoft.com/office/drawing/2018/hyperlinkcolor" val="tx"/>
-                  </a:ext>
-                </a:extLst>
-              </a:hlinkClick>
-            </a:rPr>
-            <a:t>Service Requests</a:t>
-          </a:r>
-          <a:endParaRPr lang="en-US" dirty="0">
-            <a:solidFill>
-              <a:schemeClr val="bg1"/>
-            </a:solidFill>
-          </a:endParaRPr>
         </a:p>
       </dgm:t>
     </dgm:pt>
@@ -1843,22 +1814,7 @@
         <a:p>
           <a:r>
             <a:rPr lang="en-US" dirty="0"/>
-            <a:t>Implementing SDOH </a:t>
-          </a:r>
-          <a:r>
-            <a:rPr lang="en-US" dirty="0">
-              <a:solidFill>
-                <a:schemeClr val="bg1"/>
-              </a:solidFill>
-              <a:hlinkClick xmlns:r="http://schemas.openxmlformats.org/officeDocument/2006/relationships" r:id="rId3">
-                <a:extLst>
-                  <a:ext uri="{A12FA001-AC4F-418D-AE19-62706E023703}">
-                    <ahyp:hlinkClr xmlns:ahyp="http://schemas.microsoft.com/office/drawing/2018/hyperlinkcolor" val="tx"/>
-                  </a:ext>
-                </a:extLst>
-              </a:hlinkClick>
-            </a:rPr>
-            <a:t>Procedures</a:t>
+            <a:t>Completing an SDOH Procedure</a:t>
           </a:r>
           <a:endParaRPr lang="en-US" dirty="0">
             <a:solidFill>
@@ -1926,6 +1882,42 @@
         </a:p>
       </dgm:t>
     </dgm:pt>
+    <dgm:pt modelId="{770964B0-DF36-9C49-BBC4-9DA193852D5A}">
+      <dgm:prSet/>
+      <dgm:spPr/>
+      <dgm:t>
+        <a:bodyPr/>
+        <a:lstStyle/>
+        <a:p>
+          <a:r>
+            <a:rPr lang="en-US" dirty="0"/>
+            <a:t>Creating  an SDOH Goal</a:t>
+          </a:r>
+        </a:p>
+      </dgm:t>
+    </dgm:pt>
+    <dgm:pt modelId="{75ACAD74-F108-8A44-86F5-CB8F5101060D}" type="sibTrans" cxnId="{7CE01469-A3CA-4640-8728-3333F65972AD}">
+      <dgm:prSet/>
+      <dgm:spPr/>
+      <dgm:t>
+        <a:bodyPr/>
+        <a:lstStyle/>
+        <a:p>
+          <a:endParaRPr lang="en-US"/>
+        </a:p>
+      </dgm:t>
+    </dgm:pt>
+    <dgm:pt modelId="{CB336B06-8788-2E43-B23E-2F409A364CD9}" type="parTrans" cxnId="{7CE01469-A3CA-4640-8728-3333F65972AD}">
+      <dgm:prSet/>
+      <dgm:spPr/>
+      <dgm:t>
+        <a:bodyPr/>
+        <a:lstStyle/>
+        <a:p>
+          <a:endParaRPr lang="en-US"/>
+        </a:p>
+      </dgm:t>
+    </dgm:pt>
     <dgm:pt modelId="{F37F6E55-2A6D-44C0-BD7B-557B75809A3C}" type="pres">
       <dgm:prSet presAssocID="{1D615570-610C-4C36-806D-D7EC7782F93E}" presName="cycle" presStyleCnt="0">
         <dgm:presLayoutVars>
@@ -1936,7 +1928,7 @@
       <dgm:spPr/>
     </dgm:pt>
     <dgm:pt modelId="{22EAD6D6-B81D-4FDE-B807-5D4E19D7C436}" type="pres">
-      <dgm:prSet presAssocID="{8619D14F-5E27-4317-9522-5DAD8317303E}" presName="node" presStyleLbl="node1" presStyleIdx="0" presStyleCnt="5">
+      <dgm:prSet presAssocID="{8619D14F-5E27-4317-9522-5DAD8317303E}" presName="node" presStyleLbl="node1" presStyleIdx="0" presStyleCnt="6">
         <dgm:presLayoutVars>
           <dgm:bulletEnabled val="1"/>
         </dgm:presLayoutVars>
@@ -1944,15 +1936,15 @@
       <dgm:spPr/>
     </dgm:pt>
     <dgm:pt modelId="{173E9EA6-F264-463F-924C-6AF724D13E67}" type="pres">
-      <dgm:prSet presAssocID="{0A46B89A-1938-4A14-A1CB-4BE85FADFDA3}" presName="sibTrans" presStyleLbl="sibTrans2D1" presStyleIdx="0" presStyleCnt="5"/>
+      <dgm:prSet presAssocID="{0A46B89A-1938-4A14-A1CB-4BE85FADFDA3}" presName="sibTrans" presStyleLbl="sibTrans2D1" presStyleIdx="0" presStyleCnt="6"/>
       <dgm:spPr/>
     </dgm:pt>
     <dgm:pt modelId="{39E9E889-C894-464A-92F5-D2F9A0FCD7DA}" type="pres">
-      <dgm:prSet presAssocID="{0A46B89A-1938-4A14-A1CB-4BE85FADFDA3}" presName="connectorText" presStyleLbl="sibTrans2D1" presStyleIdx="0" presStyleCnt="5"/>
+      <dgm:prSet presAssocID="{0A46B89A-1938-4A14-A1CB-4BE85FADFDA3}" presName="connectorText" presStyleLbl="sibTrans2D1" presStyleIdx="0" presStyleCnt="6"/>
       <dgm:spPr/>
     </dgm:pt>
     <dgm:pt modelId="{30A327D8-A4FD-4AE1-8319-FD8F923211DB}" type="pres">
-      <dgm:prSet presAssocID="{04BEE72E-93AE-4B04-B4F7-53E35D6FBB42}" presName="node" presStyleLbl="node1" presStyleIdx="1" presStyleCnt="5">
+      <dgm:prSet presAssocID="{04BEE72E-93AE-4B04-B4F7-53E35D6FBB42}" presName="node" presStyleLbl="node1" presStyleIdx="1" presStyleCnt="6">
         <dgm:presLayoutVars>
           <dgm:bulletEnabled val="1"/>
         </dgm:presLayoutVars>
@@ -1960,15 +1952,31 @@
       <dgm:spPr/>
     </dgm:pt>
     <dgm:pt modelId="{D3C03972-16FA-40D9-B217-E5FAA1A1077A}" type="pres">
-      <dgm:prSet presAssocID="{057AD4E1-5D03-41B3-800B-EEB6802118FA}" presName="sibTrans" presStyleLbl="sibTrans2D1" presStyleIdx="1" presStyleCnt="5"/>
+      <dgm:prSet presAssocID="{057AD4E1-5D03-41B3-800B-EEB6802118FA}" presName="sibTrans" presStyleLbl="sibTrans2D1" presStyleIdx="1" presStyleCnt="6"/>
       <dgm:spPr/>
     </dgm:pt>
     <dgm:pt modelId="{E5E4FBC8-7D9F-4770-9083-E69702D327F2}" type="pres">
-      <dgm:prSet presAssocID="{057AD4E1-5D03-41B3-800B-EEB6802118FA}" presName="connectorText" presStyleLbl="sibTrans2D1" presStyleIdx="1" presStyleCnt="5"/>
+      <dgm:prSet presAssocID="{057AD4E1-5D03-41B3-800B-EEB6802118FA}" presName="connectorText" presStyleLbl="sibTrans2D1" presStyleIdx="1" presStyleCnt="6"/>
+      <dgm:spPr/>
+    </dgm:pt>
+    <dgm:pt modelId="{3CD28F07-EA51-C645-B4AB-E178497372E2}" type="pres">
+      <dgm:prSet presAssocID="{770964B0-DF36-9C49-BBC4-9DA193852D5A}" presName="node" presStyleLbl="node1" presStyleIdx="2" presStyleCnt="6">
+        <dgm:presLayoutVars>
+          <dgm:bulletEnabled val="1"/>
+        </dgm:presLayoutVars>
+      </dgm:prSet>
+      <dgm:spPr/>
+    </dgm:pt>
+    <dgm:pt modelId="{A1435FFC-C613-3548-A8E3-A3551B5F3920}" type="pres">
+      <dgm:prSet presAssocID="{75ACAD74-F108-8A44-86F5-CB8F5101060D}" presName="sibTrans" presStyleLbl="sibTrans2D1" presStyleIdx="2" presStyleCnt="6"/>
+      <dgm:spPr/>
+    </dgm:pt>
+    <dgm:pt modelId="{CD4402D2-5E8F-474C-A660-630444F915FB}" type="pres">
+      <dgm:prSet presAssocID="{75ACAD74-F108-8A44-86F5-CB8F5101060D}" presName="connectorText" presStyleLbl="sibTrans2D1" presStyleIdx="2" presStyleCnt="6"/>
       <dgm:spPr/>
     </dgm:pt>
     <dgm:pt modelId="{F8FBF8F9-4A6E-4FB2-A058-7CD3DF73C138}" type="pres">
-      <dgm:prSet presAssocID="{F5B6293F-2CE2-42CB-A761-145DC0A6847C}" presName="node" presStyleLbl="node1" presStyleIdx="2" presStyleCnt="5">
+      <dgm:prSet presAssocID="{F5B6293F-2CE2-42CB-A761-145DC0A6847C}" presName="node" presStyleLbl="node1" presStyleIdx="3" presStyleCnt="6">
         <dgm:presLayoutVars>
           <dgm:bulletEnabled val="1"/>
         </dgm:presLayoutVars>
@@ -1976,15 +1984,15 @@
       <dgm:spPr/>
     </dgm:pt>
     <dgm:pt modelId="{8001D1BB-06E8-425A-8490-8C9B9407C877}" type="pres">
-      <dgm:prSet presAssocID="{550B50BD-8CDE-4FEE-9A63-DC1DA9850091}" presName="sibTrans" presStyleLbl="sibTrans2D1" presStyleIdx="2" presStyleCnt="5"/>
+      <dgm:prSet presAssocID="{550B50BD-8CDE-4FEE-9A63-DC1DA9850091}" presName="sibTrans" presStyleLbl="sibTrans2D1" presStyleIdx="3" presStyleCnt="6"/>
       <dgm:spPr/>
     </dgm:pt>
     <dgm:pt modelId="{165F35EC-C596-4B75-8F46-9D6FFF2D4B8A}" type="pres">
-      <dgm:prSet presAssocID="{550B50BD-8CDE-4FEE-9A63-DC1DA9850091}" presName="connectorText" presStyleLbl="sibTrans2D1" presStyleIdx="2" presStyleCnt="5"/>
+      <dgm:prSet presAssocID="{550B50BD-8CDE-4FEE-9A63-DC1DA9850091}" presName="connectorText" presStyleLbl="sibTrans2D1" presStyleIdx="3" presStyleCnt="6"/>
       <dgm:spPr/>
     </dgm:pt>
     <dgm:pt modelId="{E7F1C734-4730-49A0-9C6A-3B6882EF1F37}" type="pres">
-      <dgm:prSet presAssocID="{8277D17D-7992-434F-8F1A-5ED18A861180}" presName="node" presStyleLbl="node1" presStyleIdx="3" presStyleCnt="5">
+      <dgm:prSet presAssocID="{8277D17D-7992-434F-8F1A-5ED18A861180}" presName="node" presStyleLbl="node1" presStyleIdx="4" presStyleCnt="6">
         <dgm:presLayoutVars>
           <dgm:bulletEnabled val="1"/>
         </dgm:presLayoutVars>
@@ -1992,15 +2000,15 @@
       <dgm:spPr/>
     </dgm:pt>
     <dgm:pt modelId="{51D45CEF-A064-46C6-8016-71CF410C888D}" type="pres">
-      <dgm:prSet presAssocID="{A2796E14-CA6A-42D0-A383-39EA31804987}" presName="sibTrans" presStyleLbl="sibTrans2D1" presStyleIdx="3" presStyleCnt="5"/>
+      <dgm:prSet presAssocID="{A2796E14-CA6A-42D0-A383-39EA31804987}" presName="sibTrans" presStyleLbl="sibTrans2D1" presStyleIdx="4" presStyleCnt="6"/>
       <dgm:spPr/>
     </dgm:pt>
     <dgm:pt modelId="{BFA7AF6A-B9E4-476C-8CF3-ED806F8F2C13}" type="pres">
-      <dgm:prSet presAssocID="{A2796E14-CA6A-42D0-A383-39EA31804987}" presName="connectorText" presStyleLbl="sibTrans2D1" presStyleIdx="3" presStyleCnt="5"/>
+      <dgm:prSet presAssocID="{A2796E14-CA6A-42D0-A383-39EA31804987}" presName="connectorText" presStyleLbl="sibTrans2D1" presStyleIdx="4" presStyleCnt="6"/>
       <dgm:spPr/>
     </dgm:pt>
     <dgm:pt modelId="{19BAC6A3-ABE9-4880-93DF-E08A06928E6E}" type="pres">
-      <dgm:prSet presAssocID="{A67F26D4-28BE-4C99-ABA2-4637E4BF0C7C}" presName="node" presStyleLbl="node1" presStyleIdx="4" presStyleCnt="5">
+      <dgm:prSet presAssocID="{A67F26D4-28BE-4C99-ABA2-4637E4BF0C7C}" presName="node" presStyleLbl="node1" presStyleIdx="5" presStyleCnt="6">
         <dgm:presLayoutVars>
           <dgm:bulletEnabled val="1"/>
         </dgm:presLayoutVars>
@@ -2008,30 +2016,34 @@
       <dgm:spPr/>
     </dgm:pt>
     <dgm:pt modelId="{D7BD4620-136D-4289-BE89-E9A8E1B4627A}" type="pres">
-      <dgm:prSet presAssocID="{794B3C5D-F716-436F-AB57-77ACCF5E2E31}" presName="sibTrans" presStyleLbl="sibTrans2D1" presStyleIdx="4" presStyleCnt="5"/>
+      <dgm:prSet presAssocID="{794B3C5D-F716-436F-AB57-77ACCF5E2E31}" presName="sibTrans" presStyleLbl="sibTrans2D1" presStyleIdx="5" presStyleCnt="6"/>
       <dgm:spPr/>
     </dgm:pt>
     <dgm:pt modelId="{8158D1AE-937C-413A-9311-88171FBB550B}" type="pres">
-      <dgm:prSet presAssocID="{794B3C5D-F716-436F-AB57-77ACCF5E2E31}" presName="connectorText" presStyleLbl="sibTrans2D1" presStyleIdx="4" presStyleCnt="5"/>
+      <dgm:prSet presAssocID="{794B3C5D-F716-436F-AB57-77ACCF5E2E31}" presName="connectorText" presStyleLbl="sibTrans2D1" presStyleIdx="5" presStyleCnt="6"/>
       <dgm:spPr/>
     </dgm:pt>
   </dgm:ptLst>
   <dgm:cxnLst>
+    <dgm:cxn modelId="{59E53605-34CA-3343-9FF8-988CC7FC7776}" type="presOf" srcId="{75ACAD74-F108-8A44-86F5-CB8F5101060D}" destId="{A1435FFC-C613-3548-A8E3-A3551B5F3920}" srcOrd="0" destOrd="0" presId="urn:microsoft.com/office/officeart/2005/8/layout/cycle2"/>
     <dgm:cxn modelId="{8BD3A917-25DE-435C-9B1B-B72C8D3DEC2C}" type="presOf" srcId="{04BEE72E-93AE-4B04-B4F7-53E35D6FBB42}" destId="{30A327D8-A4FD-4AE1-8319-FD8F923211DB}" srcOrd="0" destOrd="0" presId="urn:microsoft.com/office/officeart/2005/8/layout/cycle2"/>
-    <dgm:cxn modelId="{1FA2D21B-87F0-4216-A84F-04C00C70EB96}" srcId="{1D615570-610C-4C36-806D-D7EC7782F93E}" destId="{8277D17D-7992-434F-8F1A-5ED18A861180}" srcOrd="3" destOrd="0" parTransId="{C6D70E3D-DA65-4265-AE06-0E18627141BE}" sibTransId="{A2796E14-CA6A-42D0-A383-39EA31804987}"/>
+    <dgm:cxn modelId="{1FA2D21B-87F0-4216-A84F-04C00C70EB96}" srcId="{1D615570-610C-4C36-806D-D7EC7782F93E}" destId="{8277D17D-7992-434F-8F1A-5ED18A861180}" srcOrd="4" destOrd="0" parTransId="{C6D70E3D-DA65-4265-AE06-0E18627141BE}" sibTransId="{A2796E14-CA6A-42D0-A383-39EA31804987}"/>
+    <dgm:cxn modelId="{F462D120-02BA-A149-9077-27EA7811572F}" type="presOf" srcId="{75ACAD74-F108-8A44-86F5-CB8F5101060D}" destId="{CD4402D2-5E8F-474C-A660-630444F915FB}" srcOrd="1" destOrd="0" presId="urn:microsoft.com/office/officeart/2005/8/layout/cycle2"/>
     <dgm:cxn modelId="{112AD222-0F0D-4D6E-A828-D00C23D29431}" type="presOf" srcId="{550B50BD-8CDE-4FEE-9A63-DC1DA9850091}" destId="{8001D1BB-06E8-425A-8490-8C9B9407C877}" srcOrd="0" destOrd="0" presId="urn:microsoft.com/office/officeart/2005/8/layout/cycle2"/>
+    <dgm:cxn modelId="{DB353B27-3332-0D40-B96B-46B8A888E60E}" type="presOf" srcId="{770964B0-DF36-9C49-BBC4-9DA193852D5A}" destId="{3CD28F07-EA51-C645-B4AB-E178497372E2}" srcOrd="0" destOrd="0" presId="urn:microsoft.com/office/officeart/2005/8/layout/cycle2"/>
     <dgm:cxn modelId="{BF1ED82E-2E73-419C-BD82-D4F5F32B3A17}" type="presOf" srcId="{057AD4E1-5D03-41B3-800B-EEB6802118FA}" destId="{E5E4FBC8-7D9F-4770-9083-E69702D327F2}" srcOrd="1" destOrd="0" presId="urn:microsoft.com/office/officeart/2005/8/layout/cycle2"/>
     <dgm:cxn modelId="{9E2DB63D-D210-4D4C-832E-883B48A3767C}" type="presOf" srcId="{A2796E14-CA6A-42D0-A383-39EA31804987}" destId="{BFA7AF6A-B9E4-476C-8CF3-ED806F8F2C13}" srcOrd="1" destOrd="0" presId="urn:microsoft.com/office/officeart/2005/8/layout/cycle2"/>
     <dgm:cxn modelId="{32426441-5B53-4EF5-AFA4-B0DA770D1843}" type="presOf" srcId="{057AD4E1-5D03-41B3-800B-EEB6802118FA}" destId="{D3C03972-16FA-40D9-B217-E5FAA1A1077A}" srcOrd="0" destOrd="0" presId="urn:microsoft.com/office/officeart/2005/8/layout/cycle2"/>
-    <dgm:cxn modelId="{E0146B65-60C6-4CFC-8C67-7590E51F7E0D}" srcId="{1D615570-610C-4C36-806D-D7EC7782F93E}" destId="{F5B6293F-2CE2-42CB-A761-145DC0A6847C}" srcOrd="2" destOrd="0" parTransId="{19E9DA2C-1814-47BE-82BD-EAA0EF0ED2E2}" sibTransId="{550B50BD-8CDE-4FEE-9A63-DC1DA9850091}"/>
     <dgm:cxn modelId="{C13F5D48-9AA0-417A-B163-C5A7991F44AE}" type="presOf" srcId="{F5B6293F-2CE2-42CB-A761-145DC0A6847C}" destId="{F8FBF8F9-4A6E-4FB2-A058-7CD3DF73C138}" srcOrd="0" destOrd="0" presId="urn:microsoft.com/office/officeart/2005/8/layout/cycle2"/>
-    <dgm:cxn modelId="{117EDA6F-64C7-49A4-B5B5-664E2B536FBA}" type="presOf" srcId="{8619D14F-5E27-4317-9522-5DAD8317303E}" destId="{22EAD6D6-B81D-4FDE-B807-5D4E19D7C436}" srcOrd="0" destOrd="0" presId="urn:microsoft.com/office/officeart/2005/8/layout/cycle2"/>
     <dgm:cxn modelId="{17BD0852-A9A4-494F-8131-716AFFD5FFE6}" type="presOf" srcId="{794B3C5D-F716-436F-AB57-77ACCF5E2E31}" destId="{D7BD4620-136D-4289-BE89-E9A8E1B4627A}" srcOrd="0" destOrd="0" presId="urn:microsoft.com/office/officeart/2005/8/layout/cycle2"/>
-    <dgm:cxn modelId="{01296174-350F-44A0-B8BC-23E326BAA871}" type="presOf" srcId="{794B3C5D-F716-436F-AB57-77ACCF5E2E31}" destId="{8158D1AE-937C-413A-9311-88171FBB550B}" srcOrd="1" destOrd="0" presId="urn:microsoft.com/office/officeart/2005/8/layout/cycle2"/>
     <dgm:cxn modelId="{414EC054-57AE-4768-94DE-48C675568CB9}" type="presOf" srcId="{1D615570-610C-4C36-806D-D7EC7782F93E}" destId="{F37F6E55-2A6D-44C0-BD7B-557B75809A3C}" srcOrd="0" destOrd="0" presId="urn:microsoft.com/office/officeart/2005/8/layout/cycle2"/>
     <dgm:cxn modelId="{1282AB55-C680-4422-AF4C-458ADBBC1E38}" type="presOf" srcId="{0A46B89A-1938-4A14-A1CB-4BE85FADFDA3}" destId="{173E9EA6-F264-463F-924C-6AF724D13E67}" srcOrd="0" destOrd="0" presId="urn:microsoft.com/office/officeart/2005/8/layout/cycle2"/>
+    <dgm:cxn modelId="{E0146B65-60C6-4CFC-8C67-7590E51F7E0D}" srcId="{1D615570-610C-4C36-806D-D7EC7782F93E}" destId="{F5B6293F-2CE2-42CB-A761-145DC0A6847C}" srcOrd="3" destOrd="0" parTransId="{19E9DA2C-1814-47BE-82BD-EAA0EF0ED2E2}" sibTransId="{550B50BD-8CDE-4FEE-9A63-DC1DA9850091}"/>
+    <dgm:cxn modelId="{7CE01469-A3CA-4640-8728-3333F65972AD}" srcId="{1D615570-610C-4C36-806D-D7EC7782F93E}" destId="{770964B0-DF36-9C49-BBC4-9DA193852D5A}" srcOrd="2" destOrd="0" parTransId="{CB336B06-8788-2E43-B23E-2F409A364CD9}" sibTransId="{75ACAD74-F108-8A44-86F5-CB8F5101060D}"/>
+    <dgm:cxn modelId="{117EDA6F-64C7-49A4-B5B5-664E2B536FBA}" type="presOf" srcId="{8619D14F-5E27-4317-9522-5DAD8317303E}" destId="{22EAD6D6-B81D-4FDE-B807-5D4E19D7C436}" srcOrd="0" destOrd="0" presId="urn:microsoft.com/office/officeart/2005/8/layout/cycle2"/>
+    <dgm:cxn modelId="{01296174-350F-44A0-B8BC-23E326BAA871}" type="presOf" srcId="{794B3C5D-F716-436F-AB57-77ACCF5E2E31}" destId="{8158D1AE-937C-413A-9311-88171FBB550B}" srcOrd="1" destOrd="0" presId="urn:microsoft.com/office/officeart/2005/8/layout/cycle2"/>
     <dgm:cxn modelId="{7C96427F-5DFB-498F-BEC2-F3AF0A8C71CC}" type="presOf" srcId="{0A46B89A-1938-4A14-A1CB-4BE85FADFDA3}" destId="{39E9E889-C894-464A-92F5-D2F9A0FCD7DA}" srcOrd="1" destOrd="0" presId="urn:microsoft.com/office/officeart/2005/8/layout/cycle2"/>
-    <dgm:cxn modelId="{CEF61486-7FF0-4DE8-856D-EE2017AF6797}" srcId="{1D615570-610C-4C36-806D-D7EC7782F93E}" destId="{A67F26D4-28BE-4C99-ABA2-4637E4BF0C7C}" srcOrd="4" destOrd="0" parTransId="{3495AA98-16E6-42A0-AC15-7C80077C115C}" sibTransId="{794B3C5D-F716-436F-AB57-77ACCF5E2E31}"/>
+    <dgm:cxn modelId="{CEF61486-7FF0-4DE8-856D-EE2017AF6797}" srcId="{1D615570-610C-4C36-806D-D7EC7782F93E}" destId="{A67F26D4-28BE-4C99-ABA2-4637E4BF0C7C}" srcOrd="5" destOrd="0" parTransId="{3495AA98-16E6-42A0-AC15-7C80077C115C}" sibTransId="{794B3C5D-F716-436F-AB57-77ACCF5E2E31}"/>
     <dgm:cxn modelId="{8775359D-8AF2-4744-834B-3DF3C5AB7F87}" type="presOf" srcId="{A2796E14-CA6A-42D0-A383-39EA31804987}" destId="{51D45CEF-A064-46C6-8016-71CF410C888D}" srcOrd="0" destOrd="0" presId="urn:microsoft.com/office/officeart/2005/8/layout/cycle2"/>
     <dgm:cxn modelId="{DCE3F3A0-2948-4F3F-9F56-ADEBF6744258}" type="presOf" srcId="{8277D17D-7992-434F-8F1A-5ED18A861180}" destId="{E7F1C734-4730-49A0-9C6A-3B6882EF1F37}" srcOrd="0" destOrd="0" presId="urn:microsoft.com/office/officeart/2005/8/layout/cycle2"/>
     <dgm:cxn modelId="{86F9C1B3-141A-4C74-8D1E-39F45FCB0516}" srcId="{1D615570-610C-4C36-806D-D7EC7782F93E}" destId="{8619D14F-5E27-4317-9522-5DAD8317303E}" srcOrd="0" destOrd="0" parTransId="{6685E63E-CEEB-4303-926F-7DF83DC103D4}" sibTransId="{0A46B89A-1938-4A14-A1CB-4BE85FADFDA3}"/>
@@ -2044,14 +2056,17 @@
     <dgm:cxn modelId="{F57B2B3A-7F09-4D56-ADD2-C250E1E7BEFB}" type="presParOf" srcId="{F37F6E55-2A6D-44C0-BD7B-557B75809A3C}" destId="{30A327D8-A4FD-4AE1-8319-FD8F923211DB}" srcOrd="2" destOrd="0" presId="urn:microsoft.com/office/officeart/2005/8/layout/cycle2"/>
     <dgm:cxn modelId="{098B2161-39A0-455F-9869-76161D537846}" type="presParOf" srcId="{F37F6E55-2A6D-44C0-BD7B-557B75809A3C}" destId="{D3C03972-16FA-40D9-B217-E5FAA1A1077A}" srcOrd="3" destOrd="0" presId="urn:microsoft.com/office/officeart/2005/8/layout/cycle2"/>
     <dgm:cxn modelId="{DEB00F24-116A-4F35-8878-6787B4E444A8}" type="presParOf" srcId="{D3C03972-16FA-40D9-B217-E5FAA1A1077A}" destId="{E5E4FBC8-7D9F-4770-9083-E69702D327F2}" srcOrd="0" destOrd="0" presId="urn:microsoft.com/office/officeart/2005/8/layout/cycle2"/>
-    <dgm:cxn modelId="{23D488AD-27B2-4FCB-B572-48B55B579DB8}" type="presParOf" srcId="{F37F6E55-2A6D-44C0-BD7B-557B75809A3C}" destId="{F8FBF8F9-4A6E-4FB2-A058-7CD3DF73C138}" srcOrd="4" destOrd="0" presId="urn:microsoft.com/office/officeart/2005/8/layout/cycle2"/>
-    <dgm:cxn modelId="{8499DD9E-E10C-429B-A4E9-8FBACD178D2E}" type="presParOf" srcId="{F37F6E55-2A6D-44C0-BD7B-557B75809A3C}" destId="{8001D1BB-06E8-425A-8490-8C9B9407C877}" srcOrd="5" destOrd="0" presId="urn:microsoft.com/office/officeart/2005/8/layout/cycle2"/>
+    <dgm:cxn modelId="{23B71762-6A60-4A41-B6E8-3C9F2DCC4DF7}" type="presParOf" srcId="{F37F6E55-2A6D-44C0-BD7B-557B75809A3C}" destId="{3CD28F07-EA51-C645-B4AB-E178497372E2}" srcOrd="4" destOrd="0" presId="urn:microsoft.com/office/officeart/2005/8/layout/cycle2"/>
+    <dgm:cxn modelId="{78FE9533-ED62-C442-A21B-DEAF1DF8125F}" type="presParOf" srcId="{F37F6E55-2A6D-44C0-BD7B-557B75809A3C}" destId="{A1435FFC-C613-3548-A8E3-A3551B5F3920}" srcOrd="5" destOrd="0" presId="urn:microsoft.com/office/officeart/2005/8/layout/cycle2"/>
+    <dgm:cxn modelId="{389C404B-3101-604D-A2AC-5E88C525DE0D}" type="presParOf" srcId="{A1435FFC-C613-3548-A8E3-A3551B5F3920}" destId="{CD4402D2-5E8F-474C-A660-630444F915FB}" srcOrd="0" destOrd="0" presId="urn:microsoft.com/office/officeart/2005/8/layout/cycle2"/>
+    <dgm:cxn modelId="{23D488AD-27B2-4FCB-B572-48B55B579DB8}" type="presParOf" srcId="{F37F6E55-2A6D-44C0-BD7B-557B75809A3C}" destId="{F8FBF8F9-4A6E-4FB2-A058-7CD3DF73C138}" srcOrd="6" destOrd="0" presId="urn:microsoft.com/office/officeart/2005/8/layout/cycle2"/>
+    <dgm:cxn modelId="{8499DD9E-E10C-429B-A4E9-8FBACD178D2E}" type="presParOf" srcId="{F37F6E55-2A6D-44C0-BD7B-557B75809A3C}" destId="{8001D1BB-06E8-425A-8490-8C9B9407C877}" srcOrd="7" destOrd="0" presId="urn:microsoft.com/office/officeart/2005/8/layout/cycle2"/>
     <dgm:cxn modelId="{FF11CA69-4D9C-4760-9414-1A3D82FD5430}" type="presParOf" srcId="{8001D1BB-06E8-425A-8490-8C9B9407C877}" destId="{165F35EC-C596-4B75-8F46-9D6FFF2D4B8A}" srcOrd="0" destOrd="0" presId="urn:microsoft.com/office/officeart/2005/8/layout/cycle2"/>
-    <dgm:cxn modelId="{DFBDD474-5CD3-4B95-A748-5B9A0AA92D33}" type="presParOf" srcId="{F37F6E55-2A6D-44C0-BD7B-557B75809A3C}" destId="{E7F1C734-4730-49A0-9C6A-3B6882EF1F37}" srcOrd="6" destOrd="0" presId="urn:microsoft.com/office/officeart/2005/8/layout/cycle2"/>
-    <dgm:cxn modelId="{C029F2E4-3173-4684-962C-1DF399FB927B}" type="presParOf" srcId="{F37F6E55-2A6D-44C0-BD7B-557B75809A3C}" destId="{51D45CEF-A064-46C6-8016-71CF410C888D}" srcOrd="7" destOrd="0" presId="urn:microsoft.com/office/officeart/2005/8/layout/cycle2"/>
+    <dgm:cxn modelId="{DFBDD474-5CD3-4B95-A748-5B9A0AA92D33}" type="presParOf" srcId="{F37F6E55-2A6D-44C0-BD7B-557B75809A3C}" destId="{E7F1C734-4730-49A0-9C6A-3B6882EF1F37}" srcOrd="8" destOrd="0" presId="urn:microsoft.com/office/officeart/2005/8/layout/cycle2"/>
+    <dgm:cxn modelId="{C029F2E4-3173-4684-962C-1DF399FB927B}" type="presParOf" srcId="{F37F6E55-2A6D-44C0-BD7B-557B75809A3C}" destId="{51D45CEF-A064-46C6-8016-71CF410C888D}" srcOrd="9" destOrd="0" presId="urn:microsoft.com/office/officeart/2005/8/layout/cycle2"/>
     <dgm:cxn modelId="{F67D9F0E-990D-4830-B390-42D5065584E9}" type="presParOf" srcId="{51D45CEF-A064-46C6-8016-71CF410C888D}" destId="{BFA7AF6A-B9E4-476C-8CF3-ED806F8F2C13}" srcOrd="0" destOrd="0" presId="urn:microsoft.com/office/officeart/2005/8/layout/cycle2"/>
-    <dgm:cxn modelId="{71BD5D80-726E-496B-9507-E8C48A092D65}" type="presParOf" srcId="{F37F6E55-2A6D-44C0-BD7B-557B75809A3C}" destId="{19BAC6A3-ABE9-4880-93DF-E08A06928E6E}" srcOrd="8" destOrd="0" presId="urn:microsoft.com/office/officeart/2005/8/layout/cycle2"/>
-    <dgm:cxn modelId="{4081803E-26A9-4B68-A3F2-5BD04C73F250}" type="presParOf" srcId="{F37F6E55-2A6D-44C0-BD7B-557B75809A3C}" destId="{D7BD4620-136D-4289-BE89-E9A8E1B4627A}" srcOrd="9" destOrd="0" presId="urn:microsoft.com/office/officeart/2005/8/layout/cycle2"/>
+    <dgm:cxn modelId="{71BD5D80-726E-496B-9507-E8C48A092D65}" type="presParOf" srcId="{F37F6E55-2A6D-44C0-BD7B-557B75809A3C}" destId="{19BAC6A3-ABE9-4880-93DF-E08A06928E6E}" srcOrd="10" destOrd="0" presId="urn:microsoft.com/office/officeart/2005/8/layout/cycle2"/>
+    <dgm:cxn modelId="{4081803E-26A9-4B68-A3F2-5BD04C73F250}" type="presParOf" srcId="{F37F6E55-2A6D-44C0-BD7B-557B75809A3C}" destId="{D7BD4620-136D-4289-BE89-E9A8E1B4627A}" srcOrd="11" destOrd="0" presId="urn:microsoft.com/office/officeart/2005/8/layout/cycle2"/>
     <dgm:cxn modelId="{24AE1700-8569-4D65-BB3F-BB51DC7FB409}" type="presParOf" srcId="{D7BD4620-136D-4289-BE89-E9A8E1B4627A}" destId="{8158D1AE-937C-413A-9311-88171FBB550B}" srcOrd="0" destOrd="0" presId="urn:microsoft.com/office/officeart/2005/8/layout/cycle2"/>
   </dgm:cxnLst>
   <dgm:bg/>
@@ -2370,13 +2385,13 @@
     <dgm:cxn modelId="{BF1ED82E-2E73-419C-BD82-D4F5F32B3A17}" type="presOf" srcId="{057AD4E1-5D03-41B3-800B-EEB6802118FA}" destId="{E5E4FBC8-7D9F-4770-9083-E69702D327F2}" srcOrd="1" destOrd="0" presId="urn:microsoft.com/office/officeart/2005/8/layout/cycle2"/>
     <dgm:cxn modelId="{9E2DB63D-D210-4D4C-832E-883B48A3767C}" type="presOf" srcId="{A2796E14-CA6A-42D0-A383-39EA31804987}" destId="{BFA7AF6A-B9E4-476C-8CF3-ED806F8F2C13}" srcOrd="1" destOrd="0" presId="urn:microsoft.com/office/officeart/2005/8/layout/cycle2"/>
     <dgm:cxn modelId="{32426441-5B53-4EF5-AFA4-B0DA770D1843}" type="presOf" srcId="{057AD4E1-5D03-41B3-800B-EEB6802118FA}" destId="{D3C03972-16FA-40D9-B217-E5FAA1A1077A}" srcOrd="0" destOrd="0" presId="urn:microsoft.com/office/officeart/2005/8/layout/cycle2"/>
-    <dgm:cxn modelId="{E0146B65-60C6-4CFC-8C67-7590E51F7E0D}" srcId="{1D615570-610C-4C36-806D-D7EC7782F93E}" destId="{F5B6293F-2CE2-42CB-A761-145DC0A6847C}" srcOrd="2" destOrd="0" parTransId="{19E9DA2C-1814-47BE-82BD-EAA0EF0ED2E2}" sibTransId="{550B50BD-8CDE-4FEE-9A63-DC1DA9850091}"/>
     <dgm:cxn modelId="{C13F5D48-9AA0-417A-B163-C5A7991F44AE}" type="presOf" srcId="{F5B6293F-2CE2-42CB-A761-145DC0A6847C}" destId="{F8FBF8F9-4A6E-4FB2-A058-7CD3DF73C138}" srcOrd="0" destOrd="0" presId="urn:microsoft.com/office/officeart/2005/8/layout/cycle2"/>
-    <dgm:cxn modelId="{117EDA6F-64C7-49A4-B5B5-664E2B536FBA}" type="presOf" srcId="{8619D14F-5E27-4317-9522-5DAD8317303E}" destId="{22EAD6D6-B81D-4FDE-B807-5D4E19D7C436}" srcOrd="0" destOrd="0" presId="urn:microsoft.com/office/officeart/2005/8/layout/cycle2"/>
     <dgm:cxn modelId="{17BD0852-A9A4-494F-8131-716AFFD5FFE6}" type="presOf" srcId="{794B3C5D-F716-436F-AB57-77ACCF5E2E31}" destId="{D7BD4620-136D-4289-BE89-E9A8E1B4627A}" srcOrd="0" destOrd="0" presId="urn:microsoft.com/office/officeart/2005/8/layout/cycle2"/>
-    <dgm:cxn modelId="{01296174-350F-44A0-B8BC-23E326BAA871}" type="presOf" srcId="{794B3C5D-F716-436F-AB57-77ACCF5E2E31}" destId="{8158D1AE-937C-413A-9311-88171FBB550B}" srcOrd="1" destOrd="0" presId="urn:microsoft.com/office/officeart/2005/8/layout/cycle2"/>
     <dgm:cxn modelId="{414EC054-57AE-4768-94DE-48C675568CB9}" type="presOf" srcId="{1D615570-610C-4C36-806D-D7EC7782F93E}" destId="{F37F6E55-2A6D-44C0-BD7B-557B75809A3C}" srcOrd="0" destOrd="0" presId="urn:microsoft.com/office/officeart/2005/8/layout/cycle2"/>
     <dgm:cxn modelId="{1282AB55-C680-4422-AF4C-458ADBBC1E38}" type="presOf" srcId="{0A46B89A-1938-4A14-A1CB-4BE85FADFDA3}" destId="{173E9EA6-F264-463F-924C-6AF724D13E67}" srcOrd="0" destOrd="0" presId="urn:microsoft.com/office/officeart/2005/8/layout/cycle2"/>
+    <dgm:cxn modelId="{E0146B65-60C6-4CFC-8C67-7590E51F7E0D}" srcId="{1D615570-610C-4C36-806D-D7EC7782F93E}" destId="{F5B6293F-2CE2-42CB-A761-145DC0A6847C}" srcOrd="2" destOrd="0" parTransId="{19E9DA2C-1814-47BE-82BD-EAA0EF0ED2E2}" sibTransId="{550B50BD-8CDE-4FEE-9A63-DC1DA9850091}"/>
+    <dgm:cxn modelId="{117EDA6F-64C7-49A4-B5B5-664E2B536FBA}" type="presOf" srcId="{8619D14F-5E27-4317-9522-5DAD8317303E}" destId="{22EAD6D6-B81D-4FDE-B807-5D4E19D7C436}" srcOrd="0" destOrd="0" presId="urn:microsoft.com/office/officeart/2005/8/layout/cycle2"/>
+    <dgm:cxn modelId="{01296174-350F-44A0-B8BC-23E326BAA871}" type="presOf" srcId="{794B3C5D-F716-436F-AB57-77ACCF5E2E31}" destId="{8158D1AE-937C-413A-9311-88171FBB550B}" srcOrd="1" destOrd="0" presId="urn:microsoft.com/office/officeart/2005/8/layout/cycle2"/>
     <dgm:cxn modelId="{7C96427F-5DFB-498F-BEC2-F3AF0A8C71CC}" type="presOf" srcId="{0A46B89A-1938-4A14-A1CB-4BE85FADFDA3}" destId="{39E9E889-C894-464A-92F5-D2F9A0FCD7DA}" srcOrd="1" destOrd="0" presId="urn:microsoft.com/office/officeart/2005/8/layout/cycle2"/>
     <dgm:cxn modelId="{CEF61486-7FF0-4DE8-856D-EE2017AF6797}" srcId="{1D615570-610C-4C36-806D-D7EC7782F93E}" destId="{A67F26D4-28BE-4C99-ABA2-4637E4BF0C7C}" srcOrd="4" destOrd="0" parTransId="{3495AA98-16E6-42A0-AC15-7C80077C115C}" sibTransId="{794B3C5D-F716-436F-AB57-77ACCF5E2E31}"/>
     <dgm:cxn modelId="{8775359D-8AF2-4744-834B-3DF3C5AB7F87}" type="presOf" srcId="{A2796E14-CA6A-42D0-A383-39EA31804987}" destId="{51D45CEF-A064-46C6-8016-71CF410C888D}" srcOrd="0" destOrd="0" presId="urn:microsoft.com/office/officeart/2005/8/layout/cycle2"/>
@@ -2426,8 +2441,8 @@
       </dsp:nvSpPr>
       <dsp:spPr>
         <a:xfrm>
-          <a:off x="3246437" y="534"/>
-          <a:ext cx="1635124" cy="1635124"/>
+          <a:off x="3387328" y="632"/>
+          <a:ext cx="1353343" cy="1353343"/>
         </a:xfrm>
         <a:prstGeom prst="ellipse">
           <a:avLst/>
@@ -2469,12 +2484,12 @@
         </a:fontRef>
       </dsp:style>
       <dsp:txBody>
-        <a:bodyPr spcFirstLastPara="0" vert="horz" wrap="square" lIns="19050" tIns="19050" rIns="19050" bIns="19050" numCol="1" spcCol="1270" anchor="ctr" anchorCtr="0">
+        <a:bodyPr spcFirstLastPara="0" vert="horz" wrap="square" lIns="17780" tIns="17780" rIns="17780" bIns="17780" numCol="1" spcCol="1270" anchor="ctr" anchorCtr="0">
           <a:noAutofit/>
         </a:bodyPr>
         <a:lstStyle/>
         <a:p>
-          <a:pPr marL="0" lvl="0" indent="0" algn="ctr" defTabSz="666750">
+          <a:pPr marL="0" lvl="0" indent="0" algn="ctr" defTabSz="622300">
             <a:lnSpc>
               <a:spcPct val="90000"/>
             </a:lnSpc>
@@ -2487,14 +2502,15 @@
             <a:buNone/>
           </a:pPr>
           <a:r>
-            <a:rPr lang="en-US" sz="1500" kern="1200" dirty="0"/>
-            <a:t>Assessing</a:t>
+            <a:rPr lang="en-US" sz="1400" kern="1200"/>
+            <a:t>SDOH Assessments</a:t>
           </a:r>
+          <a:endParaRPr lang="en-US" sz="1400" kern="1200" dirty="0"/>
         </a:p>
       </dsp:txBody>
       <dsp:txXfrm>
-        <a:off x="3485895" y="239992"/>
-        <a:ext cx="1156208" cy="1156208"/>
+        <a:off x="3585520" y="198824"/>
+        <a:ext cx="956959" cy="956959"/>
       </dsp:txXfrm>
     </dsp:sp>
     <dsp:sp modelId="{173E9EA6-F264-463F-924C-6AF724D13E67}">
@@ -2503,9 +2519,9 @@
         <dsp:cNvSpPr/>
       </dsp:nvSpPr>
       <dsp:spPr>
-        <a:xfrm rot="2160000">
-          <a:off x="4830234" y="1257302"/>
-          <a:ext cx="436123" cy="551854"/>
+        <a:xfrm rot="1800000">
+          <a:off x="4755226" y="951844"/>
+          <a:ext cx="359703" cy="456753"/>
         </a:xfrm>
         <a:prstGeom prst="rightArrow">
           <a:avLst>
@@ -2563,8 +2579,8 @@
         </a:p>
       </dsp:txBody>
       <dsp:txXfrm>
-        <a:off x="4842728" y="1329221"/>
-        <a:ext cx="305286" cy="331112"/>
+        <a:off x="4762455" y="1016217"/>
+        <a:ext cx="251792" cy="274051"/>
       </dsp:txXfrm>
     </dsp:sp>
     <dsp:sp modelId="{30A327D8-A4FD-4AE1-8319-FD8F923211DB}">
@@ -2574,8 +2590,8 @@
       </dsp:nvSpPr>
       <dsp:spPr>
         <a:xfrm>
-          <a:off x="5235001" y="1445310"/>
-          <a:ext cx="1635124" cy="1635124"/>
+          <a:off x="5147117" y="1016646"/>
+          <a:ext cx="1353343" cy="1353343"/>
         </a:xfrm>
         <a:prstGeom prst="ellipse">
           <a:avLst/>
@@ -2617,12 +2633,12 @@
         </a:fontRef>
       </dsp:style>
       <dsp:txBody>
-        <a:bodyPr spcFirstLastPara="0" vert="horz" wrap="square" lIns="19050" tIns="19050" rIns="19050" bIns="19050" numCol="1" spcCol="1270" anchor="ctr" anchorCtr="0">
+        <a:bodyPr spcFirstLastPara="0" vert="horz" wrap="square" lIns="17780" tIns="17780" rIns="17780" bIns="17780" numCol="1" spcCol="1270" anchor="ctr" anchorCtr="0">
           <a:noAutofit/>
         </a:bodyPr>
         <a:lstStyle/>
         <a:p>
-          <a:pPr marL="0" lvl="0" indent="0" algn="ctr" defTabSz="666750">
+          <a:pPr marL="0" lvl="0" indent="0" algn="ctr" defTabSz="622300">
             <a:lnSpc>
               <a:spcPct val="90000"/>
             </a:lnSpc>
@@ -2635,25 +2651,10 @@
             <a:buNone/>
           </a:pPr>
           <a:r>
-            <a:rPr lang="en-US" sz="1500" kern="1200" dirty="0"/>
-            <a:t>Identifying SDOH </a:t>
+            <a:rPr lang="en-US" sz="1400" kern="1200" dirty="0"/>
+            <a:t>Identifying an SDOH Condition</a:t>
           </a:r>
-          <a:r>
-            <a:rPr lang="en-US" sz="1500" kern="1200" dirty="0">
-              <a:solidFill>
-                <a:schemeClr val="bg1"/>
-              </a:solidFill>
-              <a:hlinkClick xmlns:r="http://schemas.openxmlformats.org/officeDocument/2006/relationships" r:id="rId1">
-                <a:extLst>
-                  <a:ext uri="{A12FA001-AC4F-418D-AE19-62706E023703}">
-                    <ahyp:hlinkClr xmlns:ahyp="http://schemas.microsoft.com/office/drawing/2018/hyperlinkcolor" val="tx"/>
-                  </a:ext>
-                </a:extLst>
-              </a:hlinkClick>
-            </a:rPr>
-            <a:t>Condition</a:t>
-          </a:r>
-          <a:endParaRPr lang="en-US" sz="1500" kern="1200" dirty="0">
+          <a:endParaRPr lang="en-US" sz="1400" u="sng" kern="1200" dirty="0">
             <a:solidFill>
               <a:schemeClr val="bg1"/>
             </a:solidFill>
@@ -2661,8 +2662,8 @@
         </a:p>
       </dsp:txBody>
       <dsp:txXfrm>
-        <a:off x="5474459" y="1684768"/>
-        <a:ext cx="1156208" cy="1156208"/>
+        <a:off x="5345309" y="1214838"/>
+        <a:ext cx="956959" cy="956959"/>
       </dsp:txXfrm>
     </dsp:sp>
     <dsp:sp modelId="{D3C03972-16FA-40D9-B217-E5FAA1A1077A}">
@@ -2671,9 +2672,157 @@
         <dsp:cNvSpPr/>
       </dsp:nvSpPr>
       <dsp:spPr>
-        <a:xfrm rot="6480000">
-          <a:off x="5458534" y="3144055"/>
-          <a:ext cx="436123" cy="551854"/>
+        <a:xfrm rot="5400000">
+          <a:off x="5643937" y="2470776"/>
+          <a:ext cx="359703" cy="456753"/>
+        </a:xfrm>
+        <a:prstGeom prst="rightArrow">
+          <a:avLst>
+            <a:gd name="adj1" fmla="val 60000"/>
+            <a:gd name="adj2" fmla="val 50000"/>
+          </a:avLst>
+        </a:prstGeom>
+        <a:solidFill>
+          <a:schemeClr val="accent1">
+            <a:tint val="60000"/>
+            <a:hueOff val="0"/>
+            <a:satOff val="0"/>
+            <a:lumOff val="0"/>
+            <a:alphaOff val="0"/>
+          </a:schemeClr>
+        </a:solidFill>
+        <a:ln>
+          <a:noFill/>
+        </a:ln>
+        <a:effectLst/>
+      </dsp:spPr>
+      <dsp:style>
+        <a:lnRef idx="0">
+          <a:scrgbClr r="0" g="0" b="0"/>
+        </a:lnRef>
+        <a:fillRef idx="1">
+          <a:scrgbClr r="0" g="0" b="0"/>
+        </a:fillRef>
+        <a:effectRef idx="0">
+          <a:scrgbClr r="0" g="0" b="0"/>
+        </a:effectRef>
+        <a:fontRef idx="minor">
+          <a:schemeClr val="lt1"/>
+        </a:fontRef>
+      </dsp:style>
+      <dsp:txBody>
+        <a:bodyPr spcFirstLastPara="0" vert="horz" wrap="square" lIns="0" tIns="0" rIns="0" bIns="0" numCol="1" spcCol="1270" anchor="ctr" anchorCtr="0">
+          <a:noAutofit/>
+        </a:bodyPr>
+        <a:lstStyle/>
+        <a:p>
+          <a:pPr marL="0" lvl="0" indent="0" algn="ctr" defTabSz="533400">
+            <a:lnSpc>
+              <a:spcPct val="90000"/>
+            </a:lnSpc>
+            <a:spcBef>
+              <a:spcPct val="0"/>
+            </a:spcBef>
+            <a:spcAft>
+              <a:spcPct val="35000"/>
+            </a:spcAft>
+            <a:buNone/>
+          </a:pPr>
+          <a:endParaRPr lang="en-US" sz="1200" kern="1200"/>
+        </a:p>
+      </dsp:txBody>
+      <dsp:txXfrm>
+        <a:off x="5697893" y="2508172"/>
+        <a:ext cx="251792" cy="274051"/>
+      </dsp:txXfrm>
+    </dsp:sp>
+    <dsp:sp modelId="{3CD28F07-EA51-C645-B4AB-E178497372E2}">
+      <dsp:nvSpPr>
+        <dsp:cNvPr id="0" name=""/>
+        <dsp:cNvSpPr/>
+      </dsp:nvSpPr>
+      <dsp:spPr>
+        <a:xfrm>
+          <a:off x="5147117" y="3048676"/>
+          <a:ext cx="1353343" cy="1353343"/>
+        </a:xfrm>
+        <a:prstGeom prst="ellipse">
+          <a:avLst/>
+        </a:prstGeom>
+        <a:solidFill>
+          <a:schemeClr val="accent1">
+            <a:hueOff val="0"/>
+            <a:satOff val="0"/>
+            <a:lumOff val="0"/>
+            <a:alphaOff val="0"/>
+          </a:schemeClr>
+        </a:solidFill>
+        <a:ln w="12700" cap="flat" cmpd="sng" algn="ctr">
+          <a:solidFill>
+            <a:schemeClr val="lt1">
+              <a:hueOff val="0"/>
+              <a:satOff val="0"/>
+              <a:lumOff val="0"/>
+              <a:alphaOff val="0"/>
+            </a:schemeClr>
+          </a:solidFill>
+          <a:prstDash val="solid"/>
+          <a:miter lim="800000"/>
+        </a:ln>
+        <a:effectLst/>
+      </dsp:spPr>
+      <dsp:style>
+        <a:lnRef idx="2">
+          <a:scrgbClr r="0" g="0" b="0"/>
+        </a:lnRef>
+        <a:fillRef idx="1">
+          <a:scrgbClr r="0" g="0" b="0"/>
+        </a:fillRef>
+        <a:effectRef idx="0">
+          <a:scrgbClr r="0" g="0" b="0"/>
+        </a:effectRef>
+        <a:fontRef idx="minor">
+          <a:schemeClr val="lt1"/>
+        </a:fontRef>
+      </dsp:style>
+      <dsp:txBody>
+        <a:bodyPr spcFirstLastPara="0" vert="horz" wrap="square" lIns="17780" tIns="17780" rIns="17780" bIns="17780" numCol="1" spcCol="1270" anchor="ctr" anchorCtr="0">
+          <a:noAutofit/>
+        </a:bodyPr>
+        <a:lstStyle/>
+        <a:p>
+          <a:pPr marL="0" lvl="0" indent="0" algn="ctr" defTabSz="622300">
+            <a:lnSpc>
+              <a:spcPct val="90000"/>
+            </a:lnSpc>
+            <a:spcBef>
+              <a:spcPct val="0"/>
+            </a:spcBef>
+            <a:spcAft>
+              <a:spcPct val="35000"/>
+            </a:spcAft>
+            <a:buNone/>
+          </a:pPr>
+          <a:r>
+            <a:rPr lang="en-US" sz="1400" kern="1200" dirty="0"/>
+            <a:t>Creating  an SDOH Goal</a:t>
+          </a:r>
+        </a:p>
+      </dsp:txBody>
+      <dsp:txXfrm>
+        <a:off x="5345309" y="3246868"/>
+        <a:ext cx="956959" cy="956959"/>
+      </dsp:txXfrm>
+    </dsp:sp>
+    <dsp:sp modelId="{A1435FFC-C613-3548-A8E3-A3551B5F3920}">
+      <dsp:nvSpPr>
+        <dsp:cNvPr id="0" name=""/>
+        <dsp:cNvSpPr/>
+      </dsp:nvSpPr>
+      <dsp:spPr>
+        <a:xfrm rot="9000000">
+          <a:off x="4772859" y="3999888"/>
+          <a:ext cx="359703" cy="456753"/>
         </a:xfrm>
         <a:prstGeom prst="rightArrow">
           <a:avLst>
@@ -2731,8 +2880,8 @@
         </a:p>
       </dsp:txBody>
       <dsp:txXfrm rot="10800000">
-        <a:off x="5544168" y="3192209"/>
-        <a:ext cx="305286" cy="331112"/>
+        <a:off x="4873541" y="4064261"/>
+        <a:ext cx="251792" cy="274051"/>
       </dsp:txXfrm>
     </dsp:sp>
     <dsp:sp modelId="{F8FBF8F9-4A6E-4FB2-A058-7CD3DF73C138}">
@@ -2742,8 +2891,8 @@
       </dsp:nvSpPr>
       <dsp:spPr>
         <a:xfrm>
-          <a:off x="4475437" y="3783007"/>
-          <a:ext cx="1635124" cy="1635124"/>
+          <a:off x="3387328" y="4064691"/>
+          <a:ext cx="1353343" cy="1353343"/>
         </a:xfrm>
         <a:prstGeom prst="ellipse">
           <a:avLst/>
@@ -2785,12 +2934,12 @@
         </a:fontRef>
       </dsp:style>
       <dsp:txBody>
-        <a:bodyPr spcFirstLastPara="0" vert="horz" wrap="square" lIns="19050" tIns="19050" rIns="19050" bIns="19050" numCol="1" spcCol="1270" anchor="ctr" anchorCtr="0">
+        <a:bodyPr spcFirstLastPara="0" vert="horz" wrap="square" lIns="17780" tIns="17780" rIns="17780" bIns="17780" numCol="1" spcCol="1270" anchor="ctr" anchorCtr="0">
           <a:noAutofit/>
         </a:bodyPr>
         <a:lstStyle/>
         <a:p>
-          <a:pPr marL="0" lvl="0" indent="0" algn="ctr" defTabSz="666750">
+          <a:pPr marL="0" lvl="0" indent="0" algn="ctr" defTabSz="622300">
             <a:lnSpc>
               <a:spcPct val="90000"/>
             </a:lnSpc>
@@ -2803,42 +2952,22 @@
             <a:buNone/>
           </a:pPr>
           <a:r>
-            <a:rPr lang="en-US" sz="1500" kern="1200" dirty="0"/>
-            <a:t>SDOH</a:t>
+            <a:rPr lang="en-US" sz="1400" kern="1200" dirty="0"/>
+            <a:t>Initiating an SDOH</a:t>
           </a:r>
           <a:r>
-            <a:rPr lang="en-US" sz="1500" kern="1200" dirty="0">
+            <a:rPr lang="en-US" sz="1400" kern="1200" dirty="0">
               <a:solidFill>
                 <a:schemeClr val="bg1"/>
               </a:solidFill>
             </a:rPr>
-            <a:t> </a:t>
+            <a:t> Service Request</a:t>
           </a:r>
-          <a:r>
-            <a:rPr lang="en-US" sz="1500" kern="1200" dirty="0">
-              <a:solidFill>
-                <a:schemeClr val="bg1"/>
-              </a:solidFill>
-              <a:hlinkClick xmlns:r="http://schemas.openxmlformats.org/officeDocument/2006/relationships" r:id="rId2">
-                <a:extLst>
-                  <a:ext uri="{A12FA001-AC4F-418D-AE19-62706E023703}">
-                    <ahyp:hlinkClr xmlns:ahyp="http://schemas.microsoft.com/office/drawing/2018/hyperlinkcolor" val="tx"/>
-                  </a:ext>
-                </a:extLst>
-              </a:hlinkClick>
-            </a:rPr>
-            <a:t>Service Requests</a:t>
-          </a:r>
-          <a:endParaRPr lang="en-US" sz="1500" kern="1200" dirty="0">
-            <a:solidFill>
-              <a:schemeClr val="bg1"/>
-            </a:solidFill>
-          </a:endParaRPr>
         </a:p>
       </dsp:txBody>
       <dsp:txXfrm>
-        <a:off x="4714895" y="4022465"/>
-        <a:ext cx="1156208" cy="1156208"/>
+        <a:off x="3585520" y="4262883"/>
+        <a:ext cx="956959" cy="956959"/>
       </dsp:txXfrm>
     </dsp:sp>
     <dsp:sp modelId="{8001D1BB-06E8-425A-8490-8C9B9407C877}">
@@ -2847,9 +2976,9 @@
         <dsp:cNvSpPr/>
       </dsp:nvSpPr>
       <dsp:spPr>
-        <a:xfrm rot="10800000">
-          <a:off x="3858281" y="4324642"/>
-          <a:ext cx="436123" cy="551854"/>
+        <a:xfrm rot="12600000">
+          <a:off x="3013070" y="4010069"/>
+          <a:ext cx="359703" cy="456753"/>
         </a:xfrm>
         <a:prstGeom prst="rightArrow">
           <a:avLst>
@@ -2907,8 +3036,8 @@
         </a:p>
       </dsp:txBody>
       <dsp:txXfrm rot="10800000">
-        <a:off x="3989118" y="4435013"/>
-        <a:ext cx="305286" cy="331112"/>
+        <a:off x="3113752" y="4128398"/>
+        <a:ext cx="251792" cy="274051"/>
       </dsp:txXfrm>
     </dsp:sp>
     <dsp:sp modelId="{E7F1C734-4730-49A0-9C6A-3B6882EF1F37}">
@@ -2918,8 +3047,8 @@
       </dsp:nvSpPr>
       <dsp:spPr>
         <a:xfrm>
-          <a:off x="2017437" y="3783007"/>
-          <a:ext cx="1635124" cy="1635124"/>
+          <a:off x="1627538" y="3048676"/>
+          <a:ext cx="1353343" cy="1353343"/>
         </a:xfrm>
         <a:prstGeom prst="ellipse">
           <a:avLst/>
@@ -2961,12 +3090,12 @@
         </a:fontRef>
       </dsp:style>
       <dsp:txBody>
-        <a:bodyPr spcFirstLastPara="0" vert="horz" wrap="square" lIns="19050" tIns="19050" rIns="19050" bIns="19050" numCol="1" spcCol="1270" anchor="ctr" anchorCtr="0">
+        <a:bodyPr spcFirstLastPara="0" vert="horz" wrap="square" lIns="17780" tIns="17780" rIns="17780" bIns="17780" numCol="1" spcCol="1270" anchor="ctr" anchorCtr="0">
           <a:noAutofit/>
         </a:bodyPr>
         <a:lstStyle/>
         <a:p>
-          <a:pPr marL="0" lvl="0" indent="0" algn="ctr" defTabSz="666750">
+          <a:pPr marL="0" lvl="0" indent="0" algn="ctr" defTabSz="622300">
             <a:lnSpc>
               <a:spcPct val="90000"/>
             </a:lnSpc>
@@ -2979,25 +3108,10 @@
             <a:buNone/>
           </a:pPr>
           <a:r>
-            <a:rPr lang="en-US" sz="1500" kern="1200" dirty="0"/>
-            <a:t>Implementing SDOH </a:t>
+            <a:rPr lang="en-US" sz="1400" kern="1200" dirty="0"/>
+            <a:t>Completing an SDOH Procedure</a:t>
           </a:r>
-          <a:r>
-            <a:rPr lang="en-US" sz="1500" kern="1200" dirty="0">
-              <a:solidFill>
-                <a:schemeClr val="bg1"/>
-              </a:solidFill>
-              <a:hlinkClick xmlns:r="http://schemas.openxmlformats.org/officeDocument/2006/relationships" r:id="rId3">
-                <a:extLst>
-                  <a:ext uri="{A12FA001-AC4F-418D-AE19-62706E023703}">
-                    <ahyp:hlinkClr xmlns:ahyp="http://schemas.microsoft.com/office/drawing/2018/hyperlinkcolor" val="tx"/>
-                  </a:ext>
-                </a:extLst>
-              </a:hlinkClick>
-            </a:rPr>
-            <a:t>Procedures</a:t>
-          </a:r>
-          <a:endParaRPr lang="en-US" sz="1500" kern="1200" dirty="0">
+          <a:endParaRPr lang="en-US" sz="1400" kern="1200" dirty="0">
             <a:solidFill>
               <a:schemeClr val="bg1"/>
             </a:solidFill>
@@ -3005,8 +3119,8 @@
         </a:p>
       </dsp:txBody>
       <dsp:txXfrm>
-        <a:off x="2256895" y="4022465"/>
-        <a:ext cx="1156208" cy="1156208"/>
+        <a:off x="1825730" y="3246868"/>
+        <a:ext cx="956959" cy="956959"/>
       </dsp:txXfrm>
     </dsp:sp>
     <dsp:sp modelId="{51D45CEF-A064-46C6-8016-71CF410C888D}">
@@ -3015,157 +3129,9 @@
         <dsp:cNvSpPr/>
       </dsp:nvSpPr>
       <dsp:spPr>
-        <a:xfrm rot="15120000">
-          <a:off x="2240970" y="3167533"/>
-          <a:ext cx="436123" cy="551854"/>
-        </a:xfrm>
-        <a:prstGeom prst="rightArrow">
-          <a:avLst>
-            <a:gd name="adj1" fmla="val 60000"/>
-            <a:gd name="adj2" fmla="val 50000"/>
-          </a:avLst>
-        </a:prstGeom>
-        <a:solidFill>
-          <a:schemeClr val="accent1">
-            <a:tint val="60000"/>
-            <a:hueOff val="0"/>
-            <a:satOff val="0"/>
-            <a:lumOff val="0"/>
-            <a:alphaOff val="0"/>
-          </a:schemeClr>
-        </a:solidFill>
-        <a:ln>
-          <a:noFill/>
-        </a:ln>
-        <a:effectLst/>
-      </dsp:spPr>
-      <dsp:style>
-        <a:lnRef idx="0">
-          <a:scrgbClr r="0" g="0" b="0"/>
-        </a:lnRef>
-        <a:fillRef idx="1">
-          <a:scrgbClr r="0" g="0" b="0"/>
-        </a:fillRef>
-        <a:effectRef idx="0">
-          <a:scrgbClr r="0" g="0" b="0"/>
-        </a:effectRef>
-        <a:fontRef idx="minor">
-          <a:schemeClr val="lt1"/>
-        </a:fontRef>
-      </dsp:style>
-      <dsp:txBody>
-        <a:bodyPr spcFirstLastPara="0" vert="horz" wrap="square" lIns="0" tIns="0" rIns="0" bIns="0" numCol="1" spcCol="1270" anchor="ctr" anchorCtr="0">
-          <a:noAutofit/>
-        </a:bodyPr>
-        <a:lstStyle/>
-        <a:p>
-          <a:pPr marL="0" lvl="0" indent="0" algn="ctr" defTabSz="533400">
-            <a:lnSpc>
-              <a:spcPct val="90000"/>
-            </a:lnSpc>
-            <a:spcBef>
-              <a:spcPct val="0"/>
-            </a:spcBef>
-            <a:spcAft>
-              <a:spcPct val="35000"/>
-            </a:spcAft>
-            <a:buNone/>
-          </a:pPr>
-          <a:endParaRPr lang="en-US" sz="1200" kern="1200"/>
-        </a:p>
-      </dsp:txBody>
-      <dsp:txXfrm rot="10800000">
-        <a:off x="2326604" y="3340121"/>
-        <a:ext cx="305286" cy="331112"/>
-      </dsp:txXfrm>
-    </dsp:sp>
-    <dsp:sp modelId="{19BAC6A3-ABE9-4880-93DF-E08A06928E6E}">
-      <dsp:nvSpPr>
-        <dsp:cNvPr id="0" name=""/>
-        <dsp:cNvSpPr/>
-      </dsp:nvSpPr>
-      <dsp:spPr>
-        <a:xfrm>
-          <a:off x="1257873" y="1445310"/>
-          <a:ext cx="1635124" cy="1635124"/>
-        </a:xfrm>
-        <a:prstGeom prst="ellipse">
-          <a:avLst/>
-        </a:prstGeom>
-        <a:solidFill>
-          <a:schemeClr val="accent1">
-            <a:hueOff val="0"/>
-            <a:satOff val="0"/>
-            <a:lumOff val="0"/>
-            <a:alphaOff val="0"/>
-          </a:schemeClr>
-        </a:solidFill>
-        <a:ln w="12700" cap="flat" cmpd="sng" algn="ctr">
-          <a:solidFill>
-            <a:schemeClr val="lt1">
-              <a:hueOff val="0"/>
-              <a:satOff val="0"/>
-              <a:lumOff val="0"/>
-              <a:alphaOff val="0"/>
-            </a:schemeClr>
-          </a:solidFill>
-          <a:prstDash val="solid"/>
-          <a:miter lim="800000"/>
-        </a:ln>
-        <a:effectLst/>
-      </dsp:spPr>
-      <dsp:style>
-        <a:lnRef idx="2">
-          <a:scrgbClr r="0" g="0" b="0"/>
-        </a:lnRef>
-        <a:fillRef idx="1">
-          <a:scrgbClr r="0" g="0" b="0"/>
-        </a:fillRef>
-        <a:effectRef idx="0">
-          <a:scrgbClr r="0" g="0" b="0"/>
-        </a:effectRef>
-        <a:fontRef idx="minor">
-          <a:schemeClr val="lt1"/>
-        </a:fontRef>
-      </dsp:style>
-      <dsp:txBody>
-        <a:bodyPr spcFirstLastPara="0" vert="horz" wrap="square" lIns="19050" tIns="19050" rIns="19050" bIns="19050" numCol="1" spcCol="1270" anchor="ctr" anchorCtr="0">
-          <a:noAutofit/>
-        </a:bodyPr>
-        <a:lstStyle/>
-        <a:p>
-          <a:pPr marL="0" lvl="0" indent="0" algn="ctr" defTabSz="666750">
-            <a:lnSpc>
-              <a:spcPct val="90000"/>
-            </a:lnSpc>
-            <a:spcBef>
-              <a:spcPct val="0"/>
-            </a:spcBef>
-            <a:spcAft>
-              <a:spcPct val="35000"/>
-            </a:spcAft>
-            <a:buNone/>
-          </a:pPr>
-          <a:r>
-            <a:rPr lang="en-US" sz="1500" kern="1200" dirty="0"/>
-            <a:t>Evaluating</a:t>
-          </a:r>
-        </a:p>
-      </dsp:txBody>
-      <dsp:txXfrm>
-        <a:off x="1497331" y="1684768"/>
-        <a:ext cx="1156208" cy="1156208"/>
-      </dsp:txXfrm>
-    </dsp:sp>
-    <dsp:sp modelId="{D7BD4620-136D-4289-BE89-E9A8E1B4627A}">
-      <dsp:nvSpPr>
-        <dsp:cNvPr id="0" name=""/>
-        <dsp:cNvSpPr/>
-      </dsp:nvSpPr>
-      <dsp:spPr>
-        <a:xfrm rot="19440000">
-          <a:off x="2841670" y="1271812"/>
-          <a:ext cx="436123" cy="551854"/>
+        <a:xfrm rot="16200000">
+          <a:off x="2124359" y="2491137"/>
+          <a:ext cx="359703" cy="456753"/>
         </a:xfrm>
         <a:prstGeom prst="rightArrow">
           <a:avLst>
@@ -3223,8 +3189,156 @@
         </a:p>
       </dsp:txBody>
       <dsp:txXfrm>
-        <a:off x="2854164" y="1420635"/>
-        <a:ext cx="305286" cy="331112"/>
+        <a:off x="2178315" y="2636444"/>
+        <a:ext cx="251792" cy="274051"/>
+      </dsp:txXfrm>
+    </dsp:sp>
+    <dsp:sp modelId="{19BAC6A3-ABE9-4880-93DF-E08A06928E6E}">
+      <dsp:nvSpPr>
+        <dsp:cNvPr id="0" name=""/>
+        <dsp:cNvSpPr/>
+      </dsp:nvSpPr>
+      <dsp:spPr>
+        <a:xfrm>
+          <a:off x="1627538" y="1016646"/>
+          <a:ext cx="1353343" cy="1353343"/>
+        </a:xfrm>
+        <a:prstGeom prst="ellipse">
+          <a:avLst/>
+        </a:prstGeom>
+        <a:solidFill>
+          <a:schemeClr val="accent1">
+            <a:hueOff val="0"/>
+            <a:satOff val="0"/>
+            <a:lumOff val="0"/>
+            <a:alphaOff val="0"/>
+          </a:schemeClr>
+        </a:solidFill>
+        <a:ln w="12700" cap="flat" cmpd="sng" algn="ctr">
+          <a:solidFill>
+            <a:schemeClr val="lt1">
+              <a:hueOff val="0"/>
+              <a:satOff val="0"/>
+              <a:lumOff val="0"/>
+              <a:alphaOff val="0"/>
+            </a:schemeClr>
+          </a:solidFill>
+          <a:prstDash val="solid"/>
+          <a:miter lim="800000"/>
+        </a:ln>
+        <a:effectLst/>
+      </dsp:spPr>
+      <dsp:style>
+        <a:lnRef idx="2">
+          <a:scrgbClr r="0" g="0" b="0"/>
+        </a:lnRef>
+        <a:fillRef idx="1">
+          <a:scrgbClr r="0" g="0" b="0"/>
+        </a:fillRef>
+        <a:effectRef idx="0">
+          <a:scrgbClr r="0" g="0" b="0"/>
+        </a:effectRef>
+        <a:fontRef idx="minor">
+          <a:schemeClr val="lt1"/>
+        </a:fontRef>
+      </dsp:style>
+      <dsp:txBody>
+        <a:bodyPr spcFirstLastPara="0" vert="horz" wrap="square" lIns="17780" tIns="17780" rIns="17780" bIns="17780" numCol="1" spcCol="1270" anchor="ctr" anchorCtr="0">
+          <a:noAutofit/>
+        </a:bodyPr>
+        <a:lstStyle/>
+        <a:p>
+          <a:pPr marL="0" lvl="0" indent="0" algn="ctr" defTabSz="622300">
+            <a:lnSpc>
+              <a:spcPct val="90000"/>
+            </a:lnSpc>
+            <a:spcBef>
+              <a:spcPct val="0"/>
+            </a:spcBef>
+            <a:spcAft>
+              <a:spcPct val="35000"/>
+            </a:spcAft>
+            <a:buNone/>
+          </a:pPr>
+          <a:r>
+            <a:rPr lang="en-US" sz="1400" kern="1200" dirty="0"/>
+            <a:t>Evaluating</a:t>
+          </a:r>
+        </a:p>
+      </dsp:txBody>
+      <dsp:txXfrm>
+        <a:off x="1825730" y="1214838"/>
+        <a:ext cx="956959" cy="956959"/>
+      </dsp:txXfrm>
+    </dsp:sp>
+    <dsp:sp modelId="{D7BD4620-136D-4289-BE89-E9A8E1B4627A}">
+      <dsp:nvSpPr>
+        <dsp:cNvPr id="0" name=""/>
+        <dsp:cNvSpPr/>
+      </dsp:nvSpPr>
+      <dsp:spPr>
+        <a:xfrm rot="19800000">
+          <a:off x="2995437" y="962024"/>
+          <a:ext cx="359703" cy="456753"/>
+        </a:xfrm>
+        <a:prstGeom prst="rightArrow">
+          <a:avLst>
+            <a:gd name="adj1" fmla="val 60000"/>
+            <a:gd name="adj2" fmla="val 50000"/>
+          </a:avLst>
+        </a:prstGeom>
+        <a:solidFill>
+          <a:schemeClr val="accent1">
+            <a:tint val="60000"/>
+            <a:hueOff val="0"/>
+            <a:satOff val="0"/>
+            <a:lumOff val="0"/>
+            <a:alphaOff val="0"/>
+          </a:schemeClr>
+        </a:solidFill>
+        <a:ln>
+          <a:noFill/>
+        </a:ln>
+        <a:effectLst/>
+      </dsp:spPr>
+      <dsp:style>
+        <a:lnRef idx="0">
+          <a:scrgbClr r="0" g="0" b="0"/>
+        </a:lnRef>
+        <a:fillRef idx="1">
+          <a:scrgbClr r="0" g="0" b="0"/>
+        </a:fillRef>
+        <a:effectRef idx="0">
+          <a:scrgbClr r="0" g="0" b="0"/>
+        </a:effectRef>
+        <a:fontRef idx="minor">
+          <a:schemeClr val="lt1"/>
+        </a:fontRef>
+      </dsp:style>
+      <dsp:txBody>
+        <a:bodyPr spcFirstLastPara="0" vert="horz" wrap="square" lIns="0" tIns="0" rIns="0" bIns="0" numCol="1" spcCol="1270" anchor="ctr" anchorCtr="0">
+          <a:noAutofit/>
+        </a:bodyPr>
+        <a:lstStyle/>
+        <a:p>
+          <a:pPr marL="0" lvl="0" indent="0" algn="ctr" defTabSz="533400">
+            <a:lnSpc>
+              <a:spcPct val="90000"/>
+            </a:lnSpc>
+            <a:spcBef>
+              <a:spcPct val="0"/>
+            </a:spcBef>
+            <a:spcAft>
+              <a:spcPct val="35000"/>
+            </a:spcAft>
+            <a:buNone/>
+          </a:pPr>
+          <a:endParaRPr lang="en-US" sz="1200" kern="1200"/>
+        </a:p>
+      </dsp:txBody>
+      <dsp:txXfrm>
+        <a:off x="3002666" y="1080353"/>
+        <a:ext cx="251792" cy="274051"/>
       </dsp:txXfrm>
     </dsp:sp>
   </dsp:spTree>
@@ -6635,7 +6749,7 @@
           <a:p>
             <a:fld id="{72B4A9AE-BD80-410A-BA3A-83FA175B53AD}" type="datetimeFigureOut">
               <a:rPr lang="en-US" smtClean="0"/>
-              <a:t>11/17/2021</a:t>
+              <a:t>11/20/21</a:t>
             </a:fld>
             <a:endParaRPr lang="en-US"/>
           </a:p>
@@ -6833,7 +6947,7 @@
           <a:p>
             <a:fld id="{72B4A9AE-BD80-410A-BA3A-83FA175B53AD}" type="datetimeFigureOut">
               <a:rPr lang="en-US" smtClean="0"/>
-              <a:t>11/17/2021</a:t>
+              <a:t>11/20/21</a:t>
             </a:fld>
             <a:endParaRPr lang="en-US"/>
           </a:p>
@@ -7041,7 +7155,7 @@
           <a:p>
             <a:fld id="{72B4A9AE-BD80-410A-BA3A-83FA175B53AD}" type="datetimeFigureOut">
               <a:rPr lang="en-US" smtClean="0"/>
-              <a:t>11/17/2021</a:t>
+              <a:t>11/20/21</a:t>
             </a:fld>
             <a:endParaRPr lang="en-US"/>
           </a:p>
@@ -7239,7 +7353,7 @@
           <a:p>
             <a:fld id="{72B4A9AE-BD80-410A-BA3A-83FA175B53AD}" type="datetimeFigureOut">
               <a:rPr lang="en-US" smtClean="0"/>
-              <a:t>11/17/2021</a:t>
+              <a:t>11/20/21</a:t>
             </a:fld>
             <a:endParaRPr lang="en-US"/>
           </a:p>
@@ -7514,7 +7628,7 @@
           <a:p>
             <a:fld id="{72B4A9AE-BD80-410A-BA3A-83FA175B53AD}" type="datetimeFigureOut">
               <a:rPr lang="en-US" smtClean="0"/>
-              <a:t>11/17/2021</a:t>
+              <a:t>11/20/21</a:t>
             </a:fld>
             <a:endParaRPr lang="en-US"/>
           </a:p>
@@ -7779,7 +7893,7 @@
           <a:p>
             <a:fld id="{72B4A9AE-BD80-410A-BA3A-83FA175B53AD}" type="datetimeFigureOut">
               <a:rPr lang="en-US" smtClean="0"/>
-              <a:t>11/17/2021</a:t>
+              <a:t>11/20/21</a:t>
             </a:fld>
             <a:endParaRPr lang="en-US"/>
           </a:p>
@@ -8191,7 +8305,7 @@
           <a:p>
             <a:fld id="{72B4A9AE-BD80-410A-BA3A-83FA175B53AD}" type="datetimeFigureOut">
               <a:rPr lang="en-US" smtClean="0"/>
-              <a:t>11/17/2021</a:t>
+              <a:t>11/20/21</a:t>
             </a:fld>
             <a:endParaRPr lang="en-US"/>
           </a:p>
@@ -8332,7 +8446,7 @@
           <a:p>
             <a:fld id="{72B4A9AE-BD80-410A-BA3A-83FA175B53AD}" type="datetimeFigureOut">
               <a:rPr lang="en-US" smtClean="0"/>
-              <a:t>11/17/2021</a:t>
+              <a:t>11/20/21</a:t>
             </a:fld>
             <a:endParaRPr lang="en-US"/>
           </a:p>
@@ -8445,7 +8559,7 @@
           <a:p>
             <a:fld id="{72B4A9AE-BD80-410A-BA3A-83FA175B53AD}" type="datetimeFigureOut">
               <a:rPr lang="en-US" smtClean="0"/>
-              <a:t>11/17/2021</a:t>
+              <a:t>11/20/21</a:t>
             </a:fld>
             <a:endParaRPr lang="en-US"/>
           </a:p>
@@ -8756,7 +8870,7 @@
           <a:p>
             <a:fld id="{72B4A9AE-BD80-410A-BA3A-83FA175B53AD}" type="datetimeFigureOut">
               <a:rPr lang="en-US" smtClean="0"/>
-              <a:t>11/17/2021</a:t>
+              <a:t>11/20/21</a:t>
             </a:fld>
             <a:endParaRPr lang="en-US"/>
           </a:p>
@@ -9044,7 +9158,7 @@
           <a:p>
             <a:fld id="{72B4A9AE-BD80-410A-BA3A-83FA175B53AD}" type="datetimeFigureOut">
               <a:rPr lang="en-US" smtClean="0"/>
-              <a:t>11/17/2021</a:t>
+              <a:t>11/20/21</a:t>
             </a:fld>
             <a:endParaRPr lang="en-US"/>
           </a:p>
@@ -9285,7 +9399,7 @@
           <a:p>
             <a:fld id="{72B4A9AE-BD80-410A-BA3A-83FA175B53AD}" type="datetimeFigureOut">
               <a:rPr lang="en-US" smtClean="0"/>
-              <a:t>11/17/2021</a:t>
+              <a:t>11/20/21</a:t>
             </a:fld>
             <a:endParaRPr lang="en-US"/>
           </a:p>
@@ -9801,7 +9915,7 @@
           <p:nvPr>
             <p:extLst>
               <p:ext uri="{D42A27DB-BD31-4B8C-83A1-F6EECF244321}">
-                <p14:modId xmlns:p14="http://schemas.microsoft.com/office/powerpoint/2010/main" val="2747232209"/>
+                <p14:modId xmlns:p14="http://schemas.microsoft.com/office/powerpoint/2010/main" val="3120908815"/>
               </p:ext>
             </p:extLst>
           </p:nvPr>
@@ -9830,8 +9944,8 @@
         </p:nvSpPr>
         <p:spPr>
           <a:xfrm>
-            <a:off x="3326252" y="2585391"/>
-            <a:ext cx="2153265" cy="1887794"/>
+            <a:off x="3478816" y="2512635"/>
+            <a:ext cx="1848137" cy="1832727"/>
           </a:xfrm>
           <a:prstGeom prst="ellipse">
             <a:avLst/>
@@ -9860,154 +9974,17 @@
             <a:pPr algn="ctr"/>
             <a:r>
               <a:rPr lang="en-US" dirty="0"/>
-              <a:t>SDOH Assessment and Planning Process</a:t>
+              <a:t>SDOH Activities</a:t>
             </a:r>
           </a:p>
         </p:txBody>
       </p:sp>
       <p:sp>
         <p:nvSpPr>
-          <p:cNvPr id="12" name="Rectangle 11">
+          <p:cNvPr id="6" name="TextBox 5">
             <a:extLst>
               <a:ext uri="{FF2B5EF4-FFF2-40B4-BE49-F238E27FC236}">
-                <a16:creationId xmlns:a16="http://schemas.microsoft.com/office/drawing/2014/main" id="{7611DE51-5915-406A-9757-21F593CA4C43}"/>
-              </a:ext>
-            </a:extLst>
-          </p:cNvPr>
-          <p:cNvSpPr/>
-          <p:nvPr/>
-        </p:nvSpPr>
-        <p:spPr>
-          <a:xfrm>
-            <a:off x="5936386" y="837709"/>
-            <a:ext cx="2322381" cy="330365"/>
-          </a:xfrm>
-          <a:prstGeom prst="rect">
-            <a:avLst/>
-          </a:prstGeom>
-          <a:noFill/>
-        </p:spPr>
-        <p:style>
-          <a:lnRef idx="2">
-            <a:schemeClr val="accent1">
-              <a:shade val="50000"/>
-            </a:schemeClr>
-          </a:lnRef>
-          <a:fillRef idx="1">
-            <a:schemeClr val="accent1"/>
-          </a:fillRef>
-          <a:effectRef idx="0">
-            <a:schemeClr val="accent1"/>
-          </a:effectRef>
-          <a:fontRef idx="minor">
-            <a:schemeClr val="lt1"/>
-          </a:fontRef>
-        </p:style>
-        <p:txBody>
-          <a:bodyPr rtlCol="0" anchor="ctr"/>
-          <a:lstStyle/>
-          <a:p>
-            <a:r>
-              <a:rPr lang="en-US" sz="1200" dirty="0">
-                <a:solidFill>
-                  <a:schemeClr val="tx1"/>
-                </a:solidFill>
-              </a:rPr>
-              <a:t>Record</a:t>
-            </a:r>
-            <a:r>
-              <a:rPr lang="en-US" sz="1200" dirty="0">
-                <a:solidFill>
-                  <a:schemeClr val="tx1"/>
-                </a:solidFill>
-                <a:hlinkClick r:id="rId7"/>
-              </a:rPr>
-              <a:t> Simple SDOH History Observations</a:t>
-            </a:r>
-            <a:endParaRPr lang="en-US" sz="1200" dirty="0">
-              <a:solidFill>
-                <a:schemeClr val="tx1"/>
-              </a:solidFill>
-            </a:endParaRPr>
-          </a:p>
-        </p:txBody>
-      </p:sp>
-      <p:sp>
-        <p:nvSpPr>
-          <p:cNvPr id="14" name="Rectangle 13">
-            <a:extLst>
-              <a:ext uri="{FF2B5EF4-FFF2-40B4-BE49-F238E27FC236}">
-                <a16:creationId xmlns:a16="http://schemas.microsoft.com/office/drawing/2014/main" id="{D398375E-CC0A-407B-A58A-F80467547D79}"/>
-              </a:ext>
-            </a:extLst>
-          </p:cNvPr>
-          <p:cNvSpPr/>
-          <p:nvPr/>
-        </p:nvSpPr>
-        <p:spPr>
-          <a:xfrm>
-            <a:off x="5955069" y="1449766"/>
-            <a:ext cx="2322380" cy="569194"/>
-          </a:xfrm>
-          <a:prstGeom prst="rect">
-            <a:avLst/>
-          </a:prstGeom>
-          <a:noFill/>
-        </p:spPr>
-        <p:style>
-          <a:lnRef idx="2">
-            <a:schemeClr val="accent1">
-              <a:shade val="50000"/>
-            </a:schemeClr>
-          </a:lnRef>
-          <a:fillRef idx="1">
-            <a:schemeClr val="accent1"/>
-          </a:fillRef>
-          <a:effectRef idx="0">
-            <a:schemeClr val="accent1"/>
-          </a:effectRef>
-          <a:fontRef idx="minor">
-            <a:schemeClr val="lt1"/>
-          </a:fontRef>
-        </p:style>
-        <p:txBody>
-          <a:bodyPr rtlCol="0" anchor="ctr"/>
-          <a:lstStyle/>
-          <a:p>
-            <a:r>
-              <a:rPr lang="en-US" sz="1200" dirty="0">
-                <a:solidFill>
-                  <a:schemeClr val="tx1"/>
-                </a:solidFill>
-              </a:rPr>
-              <a:t>Evaluate </a:t>
-            </a:r>
-            <a:r>
-              <a:rPr lang="en-US" sz="1200" dirty="0">
-                <a:solidFill>
-                  <a:schemeClr val="tx1"/>
-                </a:solidFill>
-                <a:hlinkClick r:id="rId8"/>
-              </a:rPr>
-              <a:t>SDOH Screening Response Observations </a:t>
-            </a:r>
-            <a:r>
-              <a:rPr lang="en-US" sz="1200" dirty="0">
-                <a:solidFill>
-                  <a:schemeClr val="tx1"/>
-                </a:solidFill>
-              </a:rPr>
-              <a:t>Representing Surveys</a:t>
-            </a:r>
-          </a:p>
-        </p:txBody>
-      </p:sp>
-      <p:sp>
-        <p:nvSpPr>
-          <p:cNvPr id="21" name="TextBox 20">
-            <a:extLst>
-              <a:ext uri="{FF2B5EF4-FFF2-40B4-BE49-F238E27FC236}">
-                <a16:creationId xmlns:a16="http://schemas.microsoft.com/office/drawing/2014/main" id="{768447CF-E764-4A39-8455-A6D4F3629650}"/>
+                <a16:creationId xmlns:a16="http://schemas.microsoft.com/office/drawing/2014/main" id="{C4E56E72-C5A8-0947-9872-7FA0E422DA1B}"/>
               </a:ext>
             </a:extLst>
           </p:cNvPr>
@@ -10016,13 +9993,20 @@
         </p:nvSpPr>
         <p:spPr>
           <a:xfrm>
-            <a:off x="129785" y="5900"/>
-            <a:ext cx="1663618" cy="523220"/>
+            <a:off x="5326952" y="674620"/>
+            <a:ext cx="3057513" cy="738664"/>
           </a:xfrm>
           <a:prstGeom prst="rect">
             <a:avLst/>
           </a:prstGeom>
           <a:noFill/>
+          <a:ln>
+            <a:solidFill>
+              <a:schemeClr val="accent1">
+                <a:shade val="50000"/>
+              </a:schemeClr>
+            </a:solidFill>
+          </a:ln>
         </p:spPr>
         <p:txBody>
           <a:bodyPr wrap="square" rtlCol="0">
@@ -10031,493 +10015,185 @@
           <a:lstStyle/>
           <a:p>
             <a:r>
-              <a:rPr lang="en-US" sz="2800" b="1" dirty="0"/>
-              <a:t>US Core</a:t>
+              <a:rPr lang="en-US" sz="1400" dirty="0"/>
+              <a:t>US Core Social History Assessment Observation Profile and US Core Screening Response Observation Profile</a:t>
             </a:r>
+            <a:endParaRPr lang="en-US" dirty="0"/>
           </a:p>
         </p:txBody>
       </p:sp>
-      <p:cxnSp>
-        <p:nvCxnSpPr>
-          <p:cNvPr id="23" name="Straight Arrow Connector 22">
+      <p:sp>
+        <p:nvSpPr>
+          <p:cNvPr id="20" name="TextBox 19">
             <a:extLst>
               <a:ext uri="{FF2B5EF4-FFF2-40B4-BE49-F238E27FC236}">
-                <a16:creationId xmlns:a16="http://schemas.microsoft.com/office/drawing/2014/main" id="{44B583A6-46D1-4C7E-9848-F60206F7EEFD}"/>
+                <a16:creationId xmlns:a16="http://schemas.microsoft.com/office/drawing/2014/main" id="{35FEF50C-78EA-C94F-8938-518692E12B07}"/>
               </a:ext>
             </a:extLst>
           </p:cNvPr>
-          <p:cNvCxnSpPr>
-            <a:cxnSpLocks/>
-          </p:cNvCxnSpPr>
-          <p:nvPr/>
-        </p:nvCxnSpPr>
-        <p:spPr>
-          <a:xfrm flipV="1">
-            <a:off x="5155707" y="973523"/>
-            <a:ext cx="780679" cy="436540"/>
-          </a:xfrm>
-          <a:prstGeom prst="straightConnector1">
-            <a:avLst/>
-          </a:prstGeom>
-          <a:ln>
-            <a:headEnd type="triangle"/>
-            <a:tailEnd type="triangle"/>
-          </a:ln>
-        </p:spPr>
-        <p:style>
-          <a:lnRef idx="1">
-            <a:schemeClr val="accent1"/>
-          </a:lnRef>
-          <a:fillRef idx="0">
-            <a:schemeClr val="accent1"/>
-          </a:fillRef>
-          <a:effectRef idx="0">
-            <a:schemeClr val="accent1"/>
-          </a:effectRef>
-          <a:fontRef idx="minor">
-            <a:schemeClr val="tx1"/>
-          </a:fontRef>
-        </p:style>
-      </p:cxnSp>
-      <p:cxnSp>
-        <p:nvCxnSpPr>
-          <p:cNvPr id="26" name="Straight Arrow Connector 25">
-            <a:extLst>
-              <a:ext uri="{FF2B5EF4-FFF2-40B4-BE49-F238E27FC236}">
-                <a16:creationId xmlns:a16="http://schemas.microsoft.com/office/drawing/2014/main" id="{20E111A1-CA0F-4300-A927-7728B4FAC651}"/>
-              </a:ext>
-            </a:extLst>
-          </p:cNvPr>
-          <p:cNvCxnSpPr>
-            <a:cxnSpLocks/>
-          </p:cNvCxnSpPr>
-          <p:nvPr/>
-        </p:nvCxnSpPr>
-        <p:spPr>
-          <a:xfrm>
-            <a:off x="5174389" y="1505336"/>
-            <a:ext cx="780680" cy="213884"/>
-          </a:xfrm>
-          <a:prstGeom prst="straightConnector1">
-            <a:avLst/>
-          </a:prstGeom>
-          <a:ln>
-            <a:headEnd type="triangle"/>
-            <a:tailEnd type="triangle"/>
-          </a:ln>
-        </p:spPr>
-        <p:style>
-          <a:lnRef idx="1">
-            <a:schemeClr val="accent1"/>
-          </a:lnRef>
-          <a:fillRef idx="0">
-            <a:schemeClr val="accent1"/>
-          </a:fillRef>
-          <a:effectRef idx="0">
-            <a:schemeClr val="accent1"/>
-          </a:effectRef>
-          <a:fontRef idx="minor">
-            <a:schemeClr val="tx1"/>
-          </a:fontRef>
-        </p:style>
-      </p:cxnSp>
-      <p:sp>
-        <p:nvSpPr>
-          <p:cNvPr id="30" name="Arrow: Curved Left 29">
-            <a:extLst>
-              <a:ext uri="{FF2B5EF4-FFF2-40B4-BE49-F238E27FC236}">
-                <a16:creationId xmlns:a16="http://schemas.microsoft.com/office/drawing/2014/main" id="{998FE95E-2E26-4443-A302-7BEE4413F382}"/>
-              </a:ext>
-            </a:extLst>
-          </p:cNvPr>
-          <p:cNvSpPr/>
+          <p:cNvSpPr txBox="1"/>
           <p:nvPr/>
         </p:nvSpPr>
         <p:spPr>
           <a:xfrm>
-            <a:off x="8307928" y="1002891"/>
-            <a:ext cx="674490" cy="929148"/>
-          </a:xfrm>
-          <a:prstGeom prst="curvedLeftArrow">
-            <a:avLst/>
-          </a:prstGeom>
-        </p:spPr>
-        <p:style>
-          <a:lnRef idx="2">
-            <a:schemeClr val="accent1">
-              <a:shade val="50000"/>
-            </a:schemeClr>
-          </a:lnRef>
-          <a:fillRef idx="1">
-            <a:schemeClr val="accent1"/>
-          </a:fillRef>
-          <a:effectRef idx="0">
-            <a:schemeClr val="accent1"/>
-          </a:effectRef>
-          <a:fontRef idx="minor">
-            <a:schemeClr val="lt1"/>
-          </a:fontRef>
-        </p:style>
-        <p:txBody>
-          <a:bodyPr rtlCol="0" anchor="ctr"/>
-          <a:lstStyle/>
-          <a:p>
-            <a:pPr algn="ctr"/>
-            <a:endParaRPr lang="en-US">
-              <a:solidFill>
-                <a:schemeClr val="tx1"/>
-              </a:solidFill>
-            </a:endParaRPr>
-          </a:p>
-        </p:txBody>
-      </p:sp>
-      <p:sp>
-        <p:nvSpPr>
-          <p:cNvPr id="31" name="Callout: Line 30">
-            <a:extLst>
-              <a:ext uri="{FF2B5EF4-FFF2-40B4-BE49-F238E27FC236}">
-                <a16:creationId xmlns:a16="http://schemas.microsoft.com/office/drawing/2014/main" id="{AF7A1464-0F92-4E50-840D-0491BBD68C0E}"/>
-              </a:ext>
-            </a:extLst>
-          </p:cNvPr>
-          <p:cNvSpPr/>
-          <p:nvPr/>
-        </p:nvSpPr>
-        <p:spPr>
-          <a:xfrm>
-            <a:off x="9083693" y="1153251"/>
-            <a:ext cx="3015883" cy="513624"/>
-          </a:xfrm>
-          <a:prstGeom prst="borderCallout1">
-            <a:avLst>
-              <a:gd name="adj1" fmla="val 50885"/>
-              <a:gd name="adj2" fmla="val -274"/>
-              <a:gd name="adj3" fmla="val 50528"/>
-              <a:gd name="adj4" fmla="val -3522"/>
-            </a:avLst>
-          </a:prstGeom>
-          <a:noFill/>
-        </p:spPr>
-        <p:style>
-          <a:lnRef idx="2">
-            <a:schemeClr val="accent1">
-              <a:shade val="50000"/>
-            </a:schemeClr>
-          </a:lnRef>
-          <a:fillRef idx="1">
-            <a:schemeClr val="accent1"/>
-          </a:fillRef>
-          <a:effectRef idx="0">
-            <a:schemeClr val="accent1"/>
-          </a:effectRef>
-          <a:fontRef idx="minor">
-            <a:schemeClr val="lt1"/>
-          </a:fontRef>
-        </p:style>
-        <p:txBody>
-          <a:bodyPr rtlCol="0" anchor="ctr"/>
-          <a:lstStyle/>
-          <a:p>
-            <a:r>
-              <a:rPr lang="en-US" sz="1200" dirty="0">
-                <a:solidFill>
-                  <a:schemeClr val="tx1"/>
-                </a:solidFill>
-              </a:rPr>
-              <a:t>Simple Social History Observations might reference surveys via </a:t>
-            </a:r>
-            <a:r>
-              <a:rPr lang="en-US" sz="1200" dirty="0" err="1">
-                <a:solidFill>
-                  <a:schemeClr val="tx1"/>
-                </a:solidFill>
-              </a:rPr>
-              <a:t>Observation.derivedFrom</a:t>
-            </a:r>
-            <a:r>
-              <a:rPr lang="en-US" sz="1200" dirty="0">
-                <a:solidFill>
-                  <a:schemeClr val="tx1"/>
-                </a:solidFill>
-              </a:rPr>
-              <a:t> (Observation)</a:t>
-            </a:r>
-          </a:p>
-        </p:txBody>
-      </p:sp>
-      <p:sp>
-        <p:nvSpPr>
-          <p:cNvPr id="34" name="Callout: Line 33">
-            <a:extLst>
-              <a:ext uri="{FF2B5EF4-FFF2-40B4-BE49-F238E27FC236}">
-                <a16:creationId xmlns:a16="http://schemas.microsoft.com/office/drawing/2014/main" id="{F428B73B-4C51-49C5-836A-349ADE6E3654}"/>
-              </a:ext>
-            </a:extLst>
-          </p:cNvPr>
-          <p:cNvSpPr/>
-          <p:nvPr/>
-        </p:nvSpPr>
-        <p:spPr>
-          <a:xfrm>
-            <a:off x="7472835" y="2714136"/>
-            <a:ext cx="3057513" cy="513624"/>
-          </a:xfrm>
-          <a:prstGeom prst="borderCallout1">
-            <a:avLst>
-              <a:gd name="adj1" fmla="val 50885"/>
-              <a:gd name="adj2" fmla="val -274"/>
-              <a:gd name="adj3" fmla="val 50528"/>
-              <a:gd name="adj4" fmla="val -9316"/>
-            </a:avLst>
-          </a:prstGeom>
-          <a:noFill/>
-        </p:spPr>
-        <p:style>
-          <a:lnRef idx="2">
-            <a:schemeClr val="accent1">
-              <a:shade val="50000"/>
-            </a:schemeClr>
-          </a:lnRef>
-          <a:fillRef idx="1">
-            <a:schemeClr val="accent1"/>
-          </a:fillRef>
-          <a:effectRef idx="0">
-            <a:schemeClr val="accent1"/>
-          </a:effectRef>
-          <a:fontRef idx="minor">
-            <a:schemeClr val="lt1"/>
-          </a:fontRef>
-        </p:style>
-        <p:txBody>
-          <a:bodyPr rtlCol="0" anchor="ctr"/>
-          <a:lstStyle/>
-          <a:p>
-            <a:r>
-              <a:rPr lang="en-US" sz="1200" dirty="0">
-                <a:solidFill>
-                  <a:schemeClr val="tx1"/>
-                </a:solidFill>
-              </a:rPr>
-              <a:t>SDOH Conditions might reference SDOH Surveys or Simple Social History Observations via </a:t>
-            </a:r>
-            <a:r>
-              <a:rPr lang="en-US" sz="1200" dirty="0" err="1">
-                <a:solidFill>
-                  <a:schemeClr val="tx1"/>
-                </a:solidFill>
-              </a:rPr>
-              <a:t>Condition.derivedFrom</a:t>
-            </a:r>
-            <a:r>
-              <a:rPr lang="en-US" sz="1200" dirty="0">
-                <a:solidFill>
-                  <a:schemeClr val="tx1"/>
-                </a:solidFill>
-              </a:rPr>
-              <a:t> (Observation)</a:t>
-            </a:r>
-          </a:p>
-        </p:txBody>
-      </p:sp>
-      <p:sp>
-        <p:nvSpPr>
-          <p:cNvPr id="35" name="Callout: Line 34">
-            <a:extLst>
-              <a:ext uri="{FF2B5EF4-FFF2-40B4-BE49-F238E27FC236}">
-                <a16:creationId xmlns:a16="http://schemas.microsoft.com/office/drawing/2014/main" id="{C99CEA8A-02E0-45C2-B12B-BBF653229F5E}"/>
-              </a:ext>
-            </a:extLst>
-          </p:cNvPr>
-          <p:cNvSpPr/>
-          <p:nvPr/>
-        </p:nvSpPr>
-        <p:spPr>
-          <a:xfrm>
-            <a:off x="6708875" y="5080255"/>
-            <a:ext cx="3361324" cy="513624"/>
-          </a:xfrm>
-          <a:prstGeom prst="borderCallout1">
-            <a:avLst>
-              <a:gd name="adj1" fmla="val 50885"/>
-              <a:gd name="adj2" fmla="val -274"/>
-              <a:gd name="adj3" fmla="val 50528"/>
-              <a:gd name="adj4" fmla="val -8103"/>
-            </a:avLst>
-          </a:prstGeom>
-          <a:noFill/>
-        </p:spPr>
-        <p:style>
-          <a:lnRef idx="2">
-            <a:schemeClr val="accent1">
-              <a:shade val="50000"/>
-            </a:schemeClr>
-          </a:lnRef>
-          <a:fillRef idx="1">
-            <a:schemeClr val="accent1"/>
-          </a:fillRef>
-          <a:effectRef idx="0">
-            <a:schemeClr val="accent1"/>
-          </a:effectRef>
-          <a:fontRef idx="minor">
-            <a:schemeClr val="lt1"/>
-          </a:fontRef>
-        </p:style>
-        <p:txBody>
-          <a:bodyPr rtlCol="0" anchor="ctr"/>
-          <a:lstStyle/>
-          <a:p>
-            <a:r>
-              <a:rPr lang="en-US" sz="1200" dirty="0">
-                <a:solidFill>
-                  <a:schemeClr val="tx1"/>
-                </a:solidFill>
-              </a:rPr>
-              <a:t>SDOH Service Requests might reference SDOH Surveys or Simple Social History Observations via </a:t>
-            </a:r>
-            <a:r>
-              <a:rPr lang="en-US" sz="1200" dirty="0" err="1">
-                <a:solidFill>
-                  <a:schemeClr val="tx1"/>
-                </a:solidFill>
-              </a:rPr>
-              <a:t>ServiceRequest.ReasonReference</a:t>
-            </a:r>
-            <a:r>
-              <a:rPr lang="en-US" sz="1200" dirty="0">
-                <a:solidFill>
-                  <a:schemeClr val="tx1"/>
-                </a:solidFill>
-              </a:rPr>
-              <a:t>(Observation)</a:t>
-            </a:r>
-          </a:p>
-        </p:txBody>
-      </p:sp>
-      <p:sp>
-        <p:nvSpPr>
-          <p:cNvPr id="36" name="Rectangle 35">
-            <a:extLst>
-              <a:ext uri="{FF2B5EF4-FFF2-40B4-BE49-F238E27FC236}">
-                <a16:creationId xmlns:a16="http://schemas.microsoft.com/office/drawing/2014/main" id="{CA40A334-F878-433A-8210-763CAD67EF1C}"/>
-              </a:ext>
-            </a:extLst>
-          </p:cNvPr>
-          <p:cNvSpPr/>
-          <p:nvPr/>
-        </p:nvSpPr>
-        <p:spPr>
-          <a:xfrm>
-            <a:off x="35399" y="4825672"/>
-            <a:ext cx="2224057" cy="914400"/>
+            <a:off x="7012367" y="2200705"/>
+            <a:ext cx="2212723" cy="307777"/>
           </a:xfrm>
           <a:prstGeom prst="rect">
             <a:avLst/>
           </a:prstGeom>
           <a:noFill/>
+          <a:ln>
+            <a:solidFill>
+              <a:schemeClr val="accent1">
+                <a:shade val="50000"/>
+              </a:schemeClr>
+            </a:solidFill>
+          </a:ln>
         </p:spPr>
-        <p:style>
-          <a:lnRef idx="2">
-            <a:schemeClr val="accent1">
-              <a:shade val="50000"/>
-            </a:schemeClr>
-          </a:lnRef>
-          <a:fillRef idx="1">
-            <a:schemeClr val="accent1"/>
-          </a:fillRef>
-          <a:effectRef idx="0">
-            <a:schemeClr val="accent1"/>
-          </a:effectRef>
-          <a:fontRef idx="minor">
-            <a:schemeClr val="lt1"/>
-          </a:fontRef>
-        </p:style>
         <p:txBody>
-          <a:bodyPr rtlCol="0" anchor="ctr"/>
+          <a:bodyPr wrap="square" rtlCol="0">
+            <a:spAutoFit/>
+          </a:bodyPr>
           <a:lstStyle/>
           <a:p>
             <a:r>
-              <a:rPr lang="en-US" sz="1200" dirty="0">
-                <a:solidFill>
-                  <a:schemeClr val="tx1"/>
-                </a:solidFill>
-              </a:rPr>
-              <a:t>SDOH Interventions might reference SDOH Surveys </a:t>
+              <a:rPr lang="en-US" sz="1400" dirty="0"/>
+              <a:t>US Core Condition Profile</a:t>
             </a:r>
-            <a:r>
-              <a:rPr lang="en-US" sz="1200">
-                <a:solidFill>
-                  <a:schemeClr val="tx1"/>
-                </a:solidFill>
-              </a:rPr>
-              <a:t>or Simple Social History </a:t>
-            </a:r>
-            <a:r>
-              <a:rPr lang="en-US" sz="1200" dirty="0">
-                <a:solidFill>
-                  <a:schemeClr val="tx1"/>
-                </a:solidFill>
-              </a:rPr>
-              <a:t>Observations via Procedure. </a:t>
-            </a:r>
-            <a:r>
-              <a:rPr lang="en-US" sz="1200" dirty="0" err="1">
-                <a:solidFill>
-                  <a:schemeClr val="tx1"/>
-                </a:solidFill>
-              </a:rPr>
-              <a:t>ReasonReference</a:t>
-            </a:r>
-            <a:r>
-              <a:rPr lang="en-US" sz="1200" dirty="0">
-                <a:solidFill>
-                  <a:schemeClr val="tx1"/>
-                </a:solidFill>
-              </a:rPr>
-              <a:t>(Observation)</a:t>
-            </a:r>
+            <a:endParaRPr lang="en-US" dirty="0"/>
           </a:p>
         </p:txBody>
       </p:sp>
-      <p:cxnSp>
-        <p:nvCxnSpPr>
-          <p:cNvPr id="38" name="Straight Connector 37">
+      <p:sp>
+        <p:nvSpPr>
+          <p:cNvPr id="24" name="TextBox 23">
             <a:extLst>
               <a:ext uri="{FF2B5EF4-FFF2-40B4-BE49-F238E27FC236}">
-                <a16:creationId xmlns:a16="http://schemas.microsoft.com/office/drawing/2014/main" id="{E016DBCA-2272-4E62-8487-8B06F0E65352}"/>
+                <a16:creationId xmlns:a16="http://schemas.microsoft.com/office/drawing/2014/main" id="{13B86937-62E1-2341-949A-FC82A40EC2FD}"/>
               </a:ext>
             </a:extLst>
           </p:cNvPr>
-          <p:cNvCxnSpPr>
-            <a:cxnSpLocks/>
-            <a:stCxn id="36" idx="3"/>
-          </p:cNvCxnSpPr>
+          <p:cNvSpPr txBox="1"/>
           <p:nvPr/>
-        </p:nvCxnSpPr>
+        </p:nvSpPr>
         <p:spPr>
           <a:xfrm>
-            <a:off x="2259456" y="5282872"/>
-            <a:ext cx="123883" cy="0"/>
+            <a:off x="7012367" y="4304471"/>
+            <a:ext cx="2212723" cy="307777"/>
           </a:xfrm>
-          <a:prstGeom prst="line">
+          <a:prstGeom prst="rect">
             <a:avLst/>
           </a:prstGeom>
-          <a:ln w="19050"/>
+          <a:noFill/>
+          <a:ln>
+            <a:solidFill>
+              <a:schemeClr val="accent1">
+                <a:shade val="50000"/>
+              </a:schemeClr>
+            </a:solidFill>
+          </a:ln>
         </p:spPr>
-        <p:style>
-          <a:lnRef idx="1">
-            <a:schemeClr val="accent1"/>
-          </a:lnRef>
-          <a:fillRef idx="0">
-            <a:schemeClr val="accent1"/>
-          </a:fillRef>
-          <a:effectRef idx="0">
-            <a:schemeClr val="accent1"/>
-          </a:effectRef>
-          <a:fontRef idx="minor">
-            <a:schemeClr val="tx1"/>
-          </a:fontRef>
-        </p:style>
-      </p:cxnSp>
+        <p:txBody>
+          <a:bodyPr wrap="square" rtlCol="0">
+            <a:spAutoFit/>
+          </a:bodyPr>
+          <a:lstStyle/>
+          <a:p>
+            <a:r>
+              <a:rPr lang="en-US" sz="1400" dirty="0"/>
+              <a:t>US Core Goal Profile</a:t>
+            </a:r>
+            <a:endParaRPr lang="en-US" dirty="0"/>
+          </a:p>
+        </p:txBody>
+      </p:sp>
+      <p:sp>
+        <p:nvSpPr>
+          <p:cNvPr id="25" name="TextBox 24">
+            <a:extLst>
+              <a:ext uri="{FF2B5EF4-FFF2-40B4-BE49-F238E27FC236}">
+                <a16:creationId xmlns:a16="http://schemas.microsoft.com/office/drawing/2014/main" id="{093CE273-18BC-E647-8CE3-C8D472B19D57}"/>
+              </a:ext>
+            </a:extLst>
+          </p:cNvPr>
+          <p:cNvSpPr txBox="1"/>
+          <p:nvPr/>
+        </p:nvSpPr>
+        <p:spPr>
+          <a:xfrm>
+            <a:off x="5326951" y="5417354"/>
+            <a:ext cx="2212723" cy="307777"/>
+          </a:xfrm>
+          <a:prstGeom prst="rect">
+            <a:avLst/>
+          </a:prstGeom>
+          <a:noFill/>
+          <a:ln>
+            <a:solidFill>
+              <a:schemeClr val="accent1">
+                <a:shade val="50000"/>
+              </a:schemeClr>
+            </a:solidFill>
+          </a:ln>
+        </p:spPr>
+        <p:txBody>
+          <a:bodyPr wrap="square" rtlCol="0">
+            <a:spAutoFit/>
+          </a:bodyPr>
+          <a:lstStyle/>
+          <a:p>
+            <a:r>
+              <a:rPr lang="en-US" sz="1400" dirty="0"/>
+              <a:t>US Service Request Profile</a:t>
+            </a:r>
+            <a:endParaRPr lang="en-US" dirty="0"/>
+          </a:p>
+        </p:txBody>
+      </p:sp>
+      <p:sp>
+        <p:nvSpPr>
+          <p:cNvPr id="27" name="TextBox 26">
+            <a:extLst>
+              <a:ext uri="{FF2B5EF4-FFF2-40B4-BE49-F238E27FC236}">
+                <a16:creationId xmlns:a16="http://schemas.microsoft.com/office/drawing/2014/main" id="{28981888-3B8F-F142-8DA5-16DB85FA384A}"/>
+              </a:ext>
+            </a:extLst>
+          </p:cNvPr>
+          <p:cNvSpPr txBox="1"/>
+          <p:nvPr/>
+        </p:nvSpPr>
+        <p:spPr>
+          <a:xfrm>
+            <a:off x="129785" y="5237249"/>
+            <a:ext cx="2212723" cy="307777"/>
+          </a:xfrm>
+          <a:prstGeom prst="rect">
+            <a:avLst/>
+          </a:prstGeom>
+          <a:noFill/>
+          <a:ln>
+            <a:solidFill>
+              <a:schemeClr val="accent1">
+                <a:shade val="50000"/>
+              </a:schemeClr>
+            </a:solidFill>
+          </a:ln>
+        </p:spPr>
+        <p:txBody>
+          <a:bodyPr wrap="square" rtlCol="0">
+            <a:spAutoFit/>
+          </a:bodyPr>
+          <a:lstStyle/>
+          <a:p>
+            <a:r>
+              <a:rPr lang="en-US" sz="1400" dirty="0"/>
+              <a:t>US Core Procedure Profile</a:t>
+            </a:r>
+            <a:endParaRPr lang="en-US" dirty="0"/>
+          </a:p>
+        </p:txBody>
+      </p:sp>
     </p:spTree>
     <p:extLst>
       <p:ext uri="{BB962C8B-B14F-4D97-AF65-F5344CB8AC3E}">

</xml_diff>